<commit_message>
Formatting for table sorted
</commit_message>
<xml_diff>
--- a/test.pptx
+++ b/test.pptx
@@ -4,8 +4,11 @@
   <p:sldMasterIdLst>
     <p:sldMasterId id="2147483648" r:id="rId1"/>
   </p:sldMasterIdLst>
+  <p:notesMasterIdLst>
+    <p:notesMasterId r:id="rId3"/>
+  </p:notesMasterIdLst>
   <p:sldIdLst>
-    <p:sldId id="256" r:id="rId7"/>
+    <p:sldId id="256" r:id="rId2"/>
   </p:sldIdLst>
   <p:sldSz cx="9144000" cy="6858000" type="screen4x3"/>
   <p:notesSz cx="6858000" cy="9144000"/>
@@ -104,7 +107,457 @@
       </a:defRPr>
     </a:lvl9pPr>
   </p:defaultTextStyle>
+  <p:extLst>
+    <p:ext uri="{EFAFB233-063F-42B5-8137-9DF3F51BA10A}">
+      <p15:sldGuideLst xmlns:p15="http://schemas.microsoft.com/office/powerpoint/2012/main">
+        <p15:guide id="1" orient="horz" pos="2160">
+          <p15:clr>
+            <a:srgbClr val="A4A3A4"/>
+          </p15:clr>
+        </p15:guide>
+        <p15:guide id="2" pos="2880">
+          <p15:clr>
+            <a:srgbClr val="A4A3A4"/>
+          </p15:clr>
+        </p15:guide>
+      </p15:sldGuideLst>
+    </p:ext>
+  </p:extLst>
 </p:presentation>
+</file>
+
+<file path=ppt/notesMasters/notesMaster1.xml><?xml version="1.0" encoding="utf-8"?>
+<p:notesMaster xmlns:a="http://schemas.openxmlformats.org/drawingml/2006/main" xmlns:r="http://schemas.openxmlformats.org/officeDocument/2006/relationships" xmlns:p="http://schemas.openxmlformats.org/presentationml/2006/main">
+  <p:cSld>
+    <p:bg>
+      <p:bgRef idx="1001">
+        <a:schemeClr val="bg1"/>
+      </p:bgRef>
+    </p:bg>
+    <p:spTree>
+      <p:nvGrpSpPr>
+        <p:cNvPr id="1" name=""/>
+        <p:cNvGrpSpPr/>
+        <p:nvPr/>
+      </p:nvGrpSpPr>
+      <p:grpSpPr>
+        <a:xfrm>
+          <a:off x="0" y="0"/>
+          <a:ext cx="0" cy="0"/>
+          <a:chOff x="0" y="0"/>
+          <a:chExt cx="0" cy="0"/>
+        </a:xfrm>
+      </p:grpSpPr>
+      <p:sp>
+        <p:nvSpPr>
+          <p:cNvPr id="2" name="Header Placeholder 1"/>
+          <p:cNvSpPr>
+            <a:spLocks noGrp="1"/>
+          </p:cNvSpPr>
+          <p:nvPr>
+            <p:ph type="hdr" sz="quarter"/>
+          </p:nvPr>
+        </p:nvSpPr>
+        <p:spPr>
+          <a:xfrm>
+            <a:off x="0" y="0"/>
+            <a:ext cx="2971800" cy="458788"/>
+          </a:xfrm>
+          <a:prstGeom prst="rect">
+            <a:avLst/>
+          </a:prstGeom>
+        </p:spPr>
+        <p:txBody>
+          <a:bodyPr vert="horz" lIns="91440" tIns="45720" rIns="91440" bIns="45720" rtlCol="0"/>
+          <a:lstStyle>
+            <a:lvl1pPr algn="l">
+              <a:defRPr sz="1200"/>
+            </a:lvl1pPr>
+          </a:lstStyle>
+          <a:p>
+            <a:endParaRPr lang="en-GB"/>
+          </a:p>
+        </p:txBody>
+      </p:sp>
+      <p:sp>
+        <p:nvSpPr>
+          <p:cNvPr id="3" name="Date Placeholder 2"/>
+          <p:cNvSpPr>
+            <a:spLocks noGrp="1"/>
+          </p:cNvSpPr>
+          <p:nvPr>
+            <p:ph type="dt" idx="1"/>
+          </p:nvPr>
+        </p:nvSpPr>
+        <p:spPr>
+          <a:xfrm>
+            <a:off x="3884613" y="0"/>
+            <a:ext cx="2971800" cy="458788"/>
+          </a:xfrm>
+          <a:prstGeom prst="rect">
+            <a:avLst/>
+          </a:prstGeom>
+        </p:spPr>
+        <p:txBody>
+          <a:bodyPr vert="horz" lIns="91440" tIns="45720" rIns="91440" bIns="45720" rtlCol="0"/>
+          <a:lstStyle>
+            <a:lvl1pPr algn="r">
+              <a:defRPr sz="1200"/>
+            </a:lvl1pPr>
+          </a:lstStyle>
+          <a:p>
+            <a:fld id="{8FD8CF7C-8450-415E-9886-876728B0A32B}" type="datetimeFigureOut">
+              <a:rPr lang="en-GB" smtClean="0"/>
+              <a:t>26/05/2024</a:t>
+            </a:fld>
+            <a:endParaRPr lang="en-GB"/>
+          </a:p>
+        </p:txBody>
+      </p:sp>
+      <p:sp>
+        <p:nvSpPr>
+          <p:cNvPr id="4" name="Slide Image Placeholder 3"/>
+          <p:cNvSpPr>
+            <a:spLocks noGrp="1" noRot="1" noChangeAspect="1"/>
+          </p:cNvSpPr>
+          <p:nvPr>
+            <p:ph type="sldImg" idx="2"/>
+          </p:nvPr>
+        </p:nvSpPr>
+        <p:spPr>
+          <a:xfrm>
+            <a:off x="1371600" y="1143000"/>
+            <a:ext cx="4114800" cy="3086100"/>
+          </a:xfrm>
+          <a:prstGeom prst="rect">
+            <a:avLst/>
+          </a:prstGeom>
+          <a:noFill/>
+          <a:ln w="12700">
+            <a:solidFill>
+              <a:prstClr val="black"/>
+            </a:solidFill>
+          </a:ln>
+        </p:spPr>
+        <p:txBody>
+          <a:bodyPr vert="horz" lIns="91440" tIns="45720" rIns="91440" bIns="45720" rtlCol="0" anchor="ctr"/>
+          <a:lstStyle/>
+          <a:p>
+            <a:endParaRPr lang="en-GB"/>
+          </a:p>
+        </p:txBody>
+      </p:sp>
+      <p:sp>
+        <p:nvSpPr>
+          <p:cNvPr id="5" name="Notes Placeholder 4"/>
+          <p:cNvSpPr>
+            <a:spLocks noGrp="1"/>
+          </p:cNvSpPr>
+          <p:nvPr>
+            <p:ph type="body" sz="quarter" idx="3"/>
+          </p:nvPr>
+        </p:nvSpPr>
+        <p:spPr>
+          <a:xfrm>
+            <a:off x="685800" y="4400550"/>
+            <a:ext cx="5486400" cy="3600450"/>
+          </a:xfrm>
+          <a:prstGeom prst="rect">
+            <a:avLst/>
+          </a:prstGeom>
+        </p:spPr>
+        <p:txBody>
+          <a:bodyPr vert="horz" lIns="91440" tIns="45720" rIns="91440" bIns="45720" rtlCol="0"/>
+          <a:lstStyle/>
+          <a:p>
+            <a:pPr lvl="0"/>
+            <a:r>
+              <a:rPr lang="en-US"/>
+              <a:t>Click to edit Master text styles</a:t>
+            </a:r>
+          </a:p>
+          <a:p>
+            <a:pPr lvl="1"/>
+            <a:r>
+              <a:rPr lang="en-US"/>
+              <a:t>Second level</a:t>
+            </a:r>
+          </a:p>
+          <a:p>
+            <a:pPr lvl="2"/>
+            <a:r>
+              <a:rPr lang="en-US"/>
+              <a:t>Third level</a:t>
+            </a:r>
+          </a:p>
+          <a:p>
+            <a:pPr lvl="3"/>
+            <a:r>
+              <a:rPr lang="en-US"/>
+              <a:t>Fourth level</a:t>
+            </a:r>
+          </a:p>
+          <a:p>
+            <a:pPr lvl="4"/>
+            <a:r>
+              <a:rPr lang="en-US"/>
+              <a:t>Fifth level</a:t>
+            </a:r>
+            <a:endParaRPr lang="en-GB"/>
+          </a:p>
+        </p:txBody>
+      </p:sp>
+      <p:sp>
+        <p:nvSpPr>
+          <p:cNvPr id="6" name="Footer Placeholder 5"/>
+          <p:cNvSpPr>
+            <a:spLocks noGrp="1"/>
+          </p:cNvSpPr>
+          <p:nvPr>
+            <p:ph type="ftr" sz="quarter" idx="4"/>
+          </p:nvPr>
+        </p:nvSpPr>
+        <p:spPr>
+          <a:xfrm>
+            <a:off x="0" y="8685213"/>
+            <a:ext cx="2971800" cy="458787"/>
+          </a:xfrm>
+          <a:prstGeom prst="rect">
+            <a:avLst/>
+          </a:prstGeom>
+        </p:spPr>
+        <p:txBody>
+          <a:bodyPr vert="horz" lIns="91440" tIns="45720" rIns="91440" bIns="45720" rtlCol="0" anchor="b"/>
+          <a:lstStyle>
+            <a:lvl1pPr algn="l">
+              <a:defRPr sz="1200"/>
+            </a:lvl1pPr>
+          </a:lstStyle>
+          <a:p>
+            <a:endParaRPr lang="en-GB"/>
+          </a:p>
+        </p:txBody>
+      </p:sp>
+      <p:sp>
+        <p:nvSpPr>
+          <p:cNvPr id="7" name="Slide Number Placeholder 6"/>
+          <p:cNvSpPr>
+            <a:spLocks noGrp="1"/>
+          </p:cNvSpPr>
+          <p:nvPr>
+            <p:ph type="sldNum" sz="quarter" idx="5"/>
+          </p:nvPr>
+        </p:nvSpPr>
+        <p:spPr>
+          <a:xfrm>
+            <a:off x="3884613" y="8685213"/>
+            <a:ext cx="2971800" cy="458787"/>
+          </a:xfrm>
+          <a:prstGeom prst="rect">
+            <a:avLst/>
+          </a:prstGeom>
+        </p:spPr>
+        <p:txBody>
+          <a:bodyPr vert="horz" lIns="91440" tIns="45720" rIns="91440" bIns="45720" rtlCol="0" anchor="b"/>
+          <a:lstStyle>
+            <a:lvl1pPr algn="r">
+              <a:defRPr sz="1200"/>
+            </a:lvl1pPr>
+          </a:lstStyle>
+          <a:p>
+            <a:fld id="{C8941BD4-BD9E-4437-9153-15911049FADD}" type="slidenum">
+              <a:rPr lang="en-GB" smtClean="0"/>
+              <a:t>‹#›</a:t>
+            </a:fld>
+            <a:endParaRPr lang="en-GB"/>
+          </a:p>
+        </p:txBody>
+      </p:sp>
+    </p:spTree>
+    <p:extLst>
+      <p:ext uri="{BB962C8B-B14F-4D97-AF65-F5344CB8AC3E}">
+        <p14:creationId xmlns:p14="http://schemas.microsoft.com/office/powerpoint/2010/main" val="2789679885"/>
+      </p:ext>
+    </p:extLst>
+  </p:cSld>
+  <p:clrMap bg1="lt1" tx1="dk1" bg2="lt2" tx2="dk2" accent1="accent1" accent2="accent2" accent3="accent3" accent4="accent4" accent5="accent5" accent6="accent6" hlink="hlink" folHlink="folHlink"/>
+  <p:notesStyle>
+    <a:lvl1pPr marL="0" algn="l" defTabSz="914400" rtl="0" eaLnBrk="1" latinLnBrk="0" hangingPunct="1">
+      <a:defRPr sz="1200" kern="1200">
+        <a:solidFill>
+          <a:schemeClr val="tx1"/>
+        </a:solidFill>
+        <a:latin typeface="+mn-lt"/>
+        <a:ea typeface="+mn-ea"/>
+        <a:cs typeface="+mn-cs"/>
+      </a:defRPr>
+    </a:lvl1pPr>
+    <a:lvl2pPr marL="457200" algn="l" defTabSz="914400" rtl="0" eaLnBrk="1" latinLnBrk="0" hangingPunct="1">
+      <a:defRPr sz="1200" kern="1200">
+        <a:solidFill>
+          <a:schemeClr val="tx1"/>
+        </a:solidFill>
+        <a:latin typeface="+mn-lt"/>
+        <a:ea typeface="+mn-ea"/>
+        <a:cs typeface="+mn-cs"/>
+      </a:defRPr>
+    </a:lvl2pPr>
+    <a:lvl3pPr marL="914400" algn="l" defTabSz="914400" rtl="0" eaLnBrk="1" latinLnBrk="0" hangingPunct="1">
+      <a:defRPr sz="1200" kern="1200">
+        <a:solidFill>
+          <a:schemeClr val="tx1"/>
+        </a:solidFill>
+        <a:latin typeface="+mn-lt"/>
+        <a:ea typeface="+mn-ea"/>
+        <a:cs typeface="+mn-cs"/>
+      </a:defRPr>
+    </a:lvl3pPr>
+    <a:lvl4pPr marL="1371600" algn="l" defTabSz="914400" rtl="0" eaLnBrk="1" latinLnBrk="0" hangingPunct="1">
+      <a:defRPr sz="1200" kern="1200">
+        <a:solidFill>
+          <a:schemeClr val="tx1"/>
+        </a:solidFill>
+        <a:latin typeface="+mn-lt"/>
+        <a:ea typeface="+mn-ea"/>
+        <a:cs typeface="+mn-cs"/>
+      </a:defRPr>
+    </a:lvl4pPr>
+    <a:lvl5pPr marL="1828800" algn="l" defTabSz="914400" rtl="0" eaLnBrk="1" latinLnBrk="0" hangingPunct="1">
+      <a:defRPr sz="1200" kern="1200">
+        <a:solidFill>
+          <a:schemeClr val="tx1"/>
+        </a:solidFill>
+        <a:latin typeface="+mn-lt"/>
+        <a:ea typeface="+mn-ea"/>
+        <a:cs typeface="+mn-cs"/>
+      </a:defRPr>
+    </a:lvl5pPr>
+    <a:lvl6pPr marL="2286000" algn="l" defTabSz="914400" rtl="0" eaLnBrk="1" latinLnBrk="0" hangingPunct="1">
+      <a:defRPr sz="1200" kern="1200">
+        <a:solidFill>
+          <a:schemeClr val="tx1"/>
+        </a:solidFill>
+        <a:latin typeface="+mn-lt"/>
+        <a:ea typeface="+mn-ea"/>
+        <a:cs typeface="+mn-cs"/>
+      </a:defRPr>
+    </a:lvl6pPr>
+    <a:lvl7pPr marL="2743200" algn="l" defTabSz="914400" rtl="0" eaLnBrk="1" latinLnBrk="0" hangingPunct="1">
+      <a:defRPr sz="1200" kern="1200">
+        <a:solidFill>
+          <a:schemeClr val="tx1"/>
+        </a:solidFill>
+        <a:latin typeface="+mn-lt"/>
+        <a:ea typeface="+mn-ea"/>
+        <a:cs typeface="+mn-cs"/>
+      </a:defRPr>
+    </a:lvl7pPr>
+    <a:lvl8pPr marL="3200400" algn="l" defTabSz="914400" rtl="0" eaLnBrk="1" latinLnBrk="0" hangingPunct="1">
+      <a:defRPr sz="1200" kern="1200">
+        <a:solidFill>
+          <a:schemeClr val="tx1"/>
+        </a:solidFill>
+        <a:latin typeface="+mn-lt"/>
+        <a:ea typeface="+mn-ea"/>
+        <a:cs typeface="+mn-cs"/>
+      </a:defRPr>
+    </a:lvl8pPr>
+    <a:lvl9pPr marL="3657600" algn="l" defTabSz="914400" rtl="0" eaLnBrk="1" latinLnBrk="0" hangingPunct="1">
+      <a:defRPr sz="1200" kern="1200">
+        <a:solidFill>
+          <a:schemeClr val="tx1"/>
+        </a:solidFill>
+        <a:latin typeface="+mn-lt"/>
+        <a:ea typeface="+mn-ea"/>
+        <a:cs typeface="+mn-cs"/>
+      </a:defRPr>
+    </a:lvl9pPr>
+  </p:notesStyle>
+</p:notesMaster>
+</file>
+
+<file path=ppt/notesSlides/notesSlide1.xml><?xml version="1.0" encoding="utf-8"?>
+<p:notes xmlns:a="http://schemas.openxmlformats.org/drawingml/2006/main" xmlns:r="http://schemas.openxmlformats.org/officeDocument/2006/relationships" xmlns:p="http://schemas.openxmlformats.org/presentationml/2006/main">
+  <p:cSld>
+    <p:spTree>
+      <p:nvGrpSpPr>
+        <p:cNvPr id="1" name=""/>
+        <p:cNvGrpSpPr/>
+        <p:nvPr/>
+      </p:nvGrpSpPr>
+      <p:grpSpPr>
+        <a:xfrm>
+          <a:off x="0" y="0"/>
+          <a:ext cx="0" cy="0"/>
+          <a:chOff x="0" y="0"/>
+          <a:chExt cx="0" cy="0"/>
+        </a:xfrm>
+      </p:grpSpPr>
+      <p:sp>
+        <p:nvSpPr>
+          <p:cNvPr id="2" name="Slide Image Placeholder 1"/>
+          <p:cNvSpPr>
+            <a:spLocks noGrp="1" noRot="1" noChangeAspect="1"/>
+          </p:cNvSpPr>
+          <p:nvPr>
+            <p:ph type="sldImg"/>
+          </p:nvPr>
+        </p:nvSpPr>
+        <p:spPr/>
+      </p:sp>
+      <p:sp>
+        <p:nvSpPr>
+          <p:cNvPr id="3" name="Notes Placeholder 2"/>
+          <p:cNvSpPr>
+            <a:spLocks noGrp="1"/>
+          </p:cNvSpPr>
+          <p:nvPr>
+            <p:ph type="body" idx="1"/>
+          </p:nvPr>
+        </p:nvSpPr>
+        <p:spPr/>
+        <p:txBody>
+          <a:bodyPr/>
+          <a:lstStyle/>
+          <a:p>
+            <a:endParaRPr lang="en-GB" dirty="0"/>
+          </a:p>
+        </p:txBody>
+      </p:sp>
+      <p:sp>
+        <p:nvSpPr>
+          <p:cNvPr id="4" name="Slide Number Placeholder 3"/>
+          <p:cNvSpPr>
+            <a:spLocks noGrp="1"/>
+          </p:cNvSpPr>
+          <p:nvPr>
+            <p:ph type="sldNum" sz="quarter" idx="5"/>
+          </p:nvPr>
+        </p:nvSpPr>
+        <p:spPr/>
+        <p:txBody>
+          <a:bodyPr/>
+          <a:lstStyle/>
+          <a:p>
+            <a:fld id="{C8941BD4-BD9E-4437-9153-15911049FADD}" type="slidenum">
+              <a:rPr lang="en-GB" smtClean="0"/>
+              <a:t>1</a:t>
+            </a:fld>
+            <a:endParaRPr lang="en-GB"/>
+          </a:p>
+        </p:txBody>
+      </p:sp>
+    </p:spTree>
+    <p:extLst>
+      <p:ext uri="{BB962C8B-B14F-4D97-AF65-F5344CB8AC3E}">
+        <p14:creationId xmlns:p14="http://schemas.microsoft.com/office/powerpoint/2010/main" val="2364108047"/>
+      </p:ext>
+    </p:extLst>
+  </p:cSld>
+  <p:clrMapOvr>
+    <a:masterClrMapping/>
+  </p:clrMapOvr>
+</p:notes>
 </file>
 
 <file path=ppt/slideLayouts/slideLayout1.xml><?xml version="1.0" encoding="utf-8"?>
@@ -145,10 +598,9 @@
           <a:lstStyle/>
           <a:p>
             <a:r>
-              <a:rPr lang="en-US" smtClean="0"/>
+              <a:rPr lang="en-US"/>
               <a:t>Click to edit Master title style</a:t>
             </a:r>
-            <a:endParaRPr lang="en-US"/>
           </a:p>
         </p:txBody>
       </p:sp>
@@ -264,10 +716,9 @@
           </a:lstStyle>
           <a:p>
             <a:r>
-              <a:rPr lang="en-US" smtClean="0"/>
+              <a:rPr lang="en-US"/>
               <a:t>Click to edit Master subtitle style</a:t>
             </a:r>
-            <a:endParaRPr lang="en-US"/>
           </a:p>
         </p:txBody>
       </p:sp>
@@ -288,7 +739,7 @@
           <a:p>
             <a:fld id="{5BCAD085-E8A6-8845-BD4E-CB4CCA059FC4}" type="datetimeFigureOut">
               <a:rPr lang="en-US" smtClean="0"/>
-              <a:t>1/27/13</a:t>
+              <a:t>5/26/2024</a:t>
             </a:fld>
             <a:endParaRPr lang="en-US"/>
           </a:p>
@@ -382,10 +833,9 @@
           <a:lstStyle/>
           <a:p>
             <a:r>
-              <a:rPr lang="en-US" smtClean="0"/>
+              <a:rPr lang="en-US"/>
               <a:t>Click to edit Master title style</a:t>
             </a:r>
-            <a:endParaRPr lang="en-US"/>
           </a:p>
         </p:txBody>
       </p:sp>
@@ -406,38 +856,37 @@
           <a:p>
             <a:pPr lvl="0"/>
             <a:r>
-              <a:rPr lang="en-US" smtClean="0"/>
+              <a:rPr lang="en-US"/>
               <a:t>Click to edit Master text styles</a:t>
             </a:r>
           </a:p>
           <a:p>
             <a:pPr lvl="1"/>
             <a:r>
-              <a:rPr lang="en-US" smtClean="0"/>
+              <a:rPr lang="en-US"/>
               <a:t>Second level</a:t>
             </a:r>
           </a:p>
           <a:p>
             <a:pPr lvl="2"/>
             <a:r>
-              <a:rPr lang="en-US" smtClean="0"/>
+              <a:rPr lang="en-US"/>
               <a:t>Third level</a:t>
             </a:r>
           </a:p>
           <a:p>
             <a:pPr lvl="3"/>
             <a:r>
-              <a:rPr lang="en-US" smtClean="0"/>
+              <a:rPr lang="en-US"/>
               <a:t>Fourth level</a:t>
             </a:r>
           </a:p>
           <a:p>
             <a:pPr lvl="4"/>
             <a:r>
-              <a:rPr lang="en-US" smtClean="0"/>
+              <a:rPr lang="en-US"/>
               <a:t>Fifth level</a:t>
             </a:r>
-            <a:endParaRPr lang="en-US"/>
           </a:p>
         </p:txBody>
       </p:sp>
@@ -458,7 +907,7 @@
           <a:p>
             <a:fld id="{5BCAD085-E8A6-8845-BD4E-CB4CCA059FC4}" type="datetimeFigureOut">
               <a:rPr lang="en-US" smtClean="0"/>
-              <a:t>1/27/13</a:t>
+              <a:t>5/26/2024</a:t>
             </a:fld>
             <a:endParaRPr lang="en-US"/>
           </a:p>
@@ -557,10 +1006,9 @@
           <a:lstStyle/>
           <a:p>
             <a:r>
-              <a:rPr lang="en-US" smtClean="0"/>
+              <a:rPr lang="en-US"/>
               <a:t>Click to edit Master title style</a:t>
             </a:r>
-            <a:endParaRPr lang="en-US"/>
           </a:p>
         </p:txBody>
       </p:sp>
@@ -586,38 +1034,37 @@
           <a:p>
             <a:pPr lvl="0"/>
             <a:r>
-              <a:rPr lang="en-US" smtClean="0"/>
+              <a:rPr lang="en-US"/>
               <a:t>Click to edit Master text styles</a:t>
             </a:r>
           </a:p>
           <a:p>
             <a:pPr lvl="1"/>
             <a:r>
-              <a:rPr lang="en-US" smtClean="0"/>
+              <a:rPr lang="en-US"/>
               <a:t>Second level</a:t>
             </a:r>
           </a:p>
           <a:p>
             <a:pPr lvl="2"/>
             <a:r>
-              <a:rPr lang="en-US" smtClean="0"/>
+              <a:rPr lang="en-US"/>
               <a:t>Third level</a:t>
             </a:r>
           </a:p>
           <a:p>
             <a:pPr lvl="3"/>
             <a:r>
-              <a:rPr lang="en-US" smtClean="0"/>
+              <a:rPr lang="en-US"/>
               <a:t>Fourth level</a:t>
             </a:r>
           </a:p>
           <a:p>
             <a:pPr lvl="4"/>
             <a:r>
-              <a:rPr lang="en-US" smtClean="0"/>
+              <a:rPr lang="en-US"/>
               <a:t>Fifth level</a:t>
             </a:r>
-            <a:endParaRPr lang="en-US"/>
           </a:p>
         </p:txBody>
       </p:sp>
@@ -638,7 +1085,7 @@
           <a:p>
             <a:fld id="{5BCAD085-E8A6-8845-BD4E-CB4CCA059FC4}" type="datetimeFigureOut">
               <a:rPr lang="en-US" smtClean="0"/>
-              <a:t>1/27/13</a:t>
+              <a:t>5/26/2024</a:t>
             </a:fld>
             <a:endParaRPr lang="en-US"/>
           </a:p>
@@ -732,10 +1179,9 @@
           <a:lstStyle/>
           <a:p>
             <a:r>
-              <a:rPr lang="en-US" smtClean="0"/>
+              <a:rPr lang="en-US"/>
               <a:t>Click to edit Master title style</a:t>
             </a:r>
-            <a:endParaRPr lang="en-US"/>
           </a:p>
         </p:txBody>
       </p:sp>
@@ -756,38 +1202,37 @@
           <a:p>
             <a:pPr lvl="0"/>
             <a:r>
-              <a:rPr lang="en-US" smtClean="0"/>
+              <a:rPr lang="en-US"/>
               <a:t>Click to edit Master text styles</a:t>
             </a:r>
           </a:p>
           <a:p>
             <a:pPr lvl="1"/>
             <a:r>
-              <a:rPr lang="en-US" smtClean="0"/>
+              <a:rPr lang="en-US"/>
               <a:t>Second level</a:t>
             </a:r>
           </a:p>
           <a:p>
             <a:pPr lvl="2"/>
             <a:r>
-              <a:rPr lang="en-US" smtClean="0"/>
+              <a:rPr lang="en-US"/>
               <a:t>Third level</a:t>
             </a:r>
           </a:p>
           <a:p>
             <a:pPr lvl="3"/>
             <a:r>
-              <a:rPr lang="en-US" smtClean="0"/>
+              <a:rPr lang="en-US"/>
               <a:t>Fourth level</a:t>
             </a:r>
           </a:p>
           <a:p>
             <a:pPr lvl="4"/>
             <a:r>
-              <a:rPr lang="en-US" smtClean="0"/>
+              <a:rPr lang="en-US"/>
               <a:t>Fifth level</a:t>
             </a:r>
-            <a:endParaRPr lang="en-US"/>
           </a:p>
         </p:txBody>
       </p:sp>
@@ -808,7 +1253,7 @@
           <a:p>
             <a:fld id="{5BCAD085-E8A6-8845-BD4E-CB4CCA059FC4}" type="datetimeFigureOut">
               <a:rPr lang="en-US" smtClean="0"/>
-              <a:t>1/27/13</a:t>
+              <a:t>5/26/2024</a:t>
             </a:fld>
             <a:endParaRPr lang="en-US"/>
           </a:p>
@@ -911,10 +1356,9 @@
           </a:lstStyle>
           <a:p>
             <a:r>
-              <a:rPr lang="en-US" smtClean="0"/>
+              <a:rPr lang="en-US"/>
               <a:t>Click to edit Master title style</a:t>
             </a:r>
-            <a:endParaRPr lang="en-US"/>
           </a:p>
         </p:txBody>
       </p:sp>
@@ -1031,7 +1475,7 @@
           <a:p>
             <a:pPr lvl="0"/>
             <a:r>
-              <a:rPr lang="en-US" smtClean="0"/>
+              <a:rPr lang="en-US"/>
               <a:t>Click to edit Master text styles</a:t>
             </a:r>
           </a:p>
@@ -1054,7 +1498,7 @@
           <a:p>
             <a:fld id="{5BCAD085-E8A6-8845-BD4E-CB4CCA059FC4}" type="datetimeFigureOut">
               <a:rPr lang="en-US" smtClean="0"/>
-              <a:t>1/27/13</a:t>
+              <a:t>5/26/2024</a:t>
             </a:fld>
             <a:endParaRPr lang="en-US"/>
           </a:p>
@@ -1148,10 +1592,9 @@
           <a:lstStyle/>
           <a:p>
             <a:r>
-              <a:rPr lang="en-US" smtClean="0"/>
+              <a:rPr lang="en-US"/>
               <a:t>Click to edit Master title style</a:t>
             </a:r>
-            <a:endParaRPr lang="en-US"/>
           </a:p>
         </p:txBody>
       </p:sp>
@@ -1205,38 +1648,37 @@
           <a:p>
             <a:pPr lvl="0"/>
             <a:r>
-              <a:rPr lang="en-US" smtClean="0"/>
+              <a:rPr lang="en-US"/>
               <a:t>Click to edit Master text styles</a:t>
             </a:r>
           </a:p>
           <a:p>
             <a:pPr lvl="1"/>
             <a:r>
-              <a:rPr lang="en-US" smtClean="0"/>
+              <a:rPr lang="en-US"/>
               <a:t>Second level</a:t>
             </a:r>
           </a:p>
           <a:p>
             <a:pPr lvl="2"/>
             <a:r>
-              <a:rPr lang="en-US" smtClean="0"/>
+              <a:rPr lang="en-US"/>
               <a:t>Third level</a:t>
             </a:r>
           </a:p>
           <a:p>
             <a:pPr lvl="3"/>
             <a:r>
-              <a:rPr lang="en-US" smtClean="0"/>
+              <a:rPr lang="en-US"/>
               <a:t>Fourth level</a:t>
             </a:r>
           </a:p>
           <a:p>
             <a:pPr lvl="4"/>
             <a:r>
-              <a:rPr lang="en-US" smtClean="0"/>
+              <a:rPr lang="en-US"/>
               <a:t>Fifth level</a:t>
             </a:r>
-            <a:endParaRPr lang="en-US"/>
           </a:p>
         </p:txBody>
       </p:sp>
@@ -1290,38 +1732,37 @@
           <a:p>
             <a:pPr lvl="0"/>
             <a:r>
-              <a:rPr lang="en-US" smtClean="0"/>
+              <a:rPr lang="en-US"/>
               <a:t>Click to edit Master text styles</a:t>
             </a:r>
           </a:p>
           <a:p>
             <a:pPr lvl="1"/>
             <a:r>
-              <a:rPr lang="en-US" smtClean="0"/>
+              <a:rPr lang="en-US"/>
               <a:t>Second level</a:t>
             </a:r>
           </a:p>
           <a:p>
             <a:pPr lvl="2"/>
             <a:r>
-              <a:rPr lang="en-US" smtClean="0"/>
+              <a:rPr lang="en-US"/>
               <a:t>Third level</a:t>
             </a:r>
           </a:p>
           <a:p>
             <a:pPr lvl="3"/>
             <a:r>
-              <a:rPr lang="en-US" smtClean="0"/>
+              <a:rPr lang="en-US"/>
               <a:t>Fourth level</a:t>
             </a:r>
           </a:p>
           <a:p>
             <a:pPr lvl="4"/>
             <a:r>
-              <a:rPr lang="en-US" smtClean="0"/>
+              <a:rPr lang="en-US"/>
               <a:t>Fifth level</a:t>
             </a:r>
-            <a:endParaRPr lang="en-US"/>
           </a:p>
         </p:txBody>
       </p:sp>
@@ -1342,7 +1783,7 @@
           <a:p>
             <a:fld id="{5BCAD085-E8A6-8845-BD4E-CB4CCA059FC4}" type="datetimeFigureOut">
               <a:rPr lang="en-US" smtClean="0"/>
-              <a:t>1/27/13</a:t>
+              <a:t>5/26/2024</a:t>
             </a:fld>
             <a:endParaRPr lang="en-US"/>
           </a:p>
@@ -1440,10 +1881,9 @@
           </a:lstStyle>
           <a:p>
             <a:r>
-              <a:rPr lang="en-US" smtClean="0"/>
+              <a:rPr lang="en-US"/>
               <a:t>Click to edit Master title style</a:t>
             </a:r>
-            <a:endParaRPr lang="en-US"/>
           </a:p>
         </p:txBody>
       </p:sp>
@@ -1506,7 +1946,7 @@
           <a:p>
             <a:pPr lvl="0"/>
             <a:r>
-              <a:rPr lang="en-US" smtClean="0"/>
+              <a:rPr lang="en-US"/>
               <a:t>Click to edit Master text styles</a:t>
             </a:r>
           </a:p>
@@ -1562,38 +2002,37 @@
           <a:p>
             <a:pPr lvl="0"/>
             <a:r>
-              <a:rPr lang="en-US" smtClean="0"/>
+              <a:rPr lang="en-US"/>
               <a:t>Click to edit Master text styles</a:t>
             </a:r>
           </a:p>
           <a:p>
             <a:pPr lvl="1"/>
             <a:r>
-              <a:rPr lang="en-US" smtClean="0"/>
+              <a:rPr lang="en-US"/>
               <a:t>Second level</a:t>
             </a:r>
           </a:p>
           <a:p>
             <a:pPr lvl="2"/>
             <a:r>
-              <a:rPr lang="en-US" smtClean="0"/>
+              <a:rPr lang="en-US"/>
               <a:t>Third level</a:t>
             </a:r>
           </a:p>
           <a:p>
             <a:pPr lvl="3"/>
             <a:r>
-              <a:rPr lang="en-US" smtClean="0"/>
+              <a:rPr lang="en-US"/>
               <a:t>Fourth level</a:t>
             </a:r>
           </a:p>
           <a:p>
             <a:pPr lvl="4"/>
             <a:r>
-              <a:rPr lang="en-US" smtClean="0"/>
+              <a:rPr lang="en-US"/>
               <a:t>Fifth level</a:t>
             </a:r>
-            <a:endParaRPr lang="en-US"/>
           </a:p>
         </p:txBody>
       </p:sp>
@@ -1656,7 +2095,7 @@
           <a:p>
             <a:pPr lvl="0"/>
             <a:r>
-              <a:rPr lang="en-US" smtClean="0"/>
+              <a:rPr lang="en-US"/>
               <a:t>Click to edit Master text styles</a:t>
             </a:r>
           </a:p>
@@ -1712,38 +2151,37 @@
           <a:p>
             <a:pPr lvl="0"/>
             <a:r>
-              <a:rPr lang="en-US" smtClean="0"/>
+              <a:rPr lang="en-US"/>
               <a:t>Click to edit Master text styles</a:t>
             </a:r>
           </a:p>
           <a:p>
             <a:pPr lvl="1"/>
             <a:r>
-              <a:rPr lang="en-US" smtClean="0"/>
+              <a:rPr lang="en-US"/>
               <a:t>Second level</a:t>
             </a:r>
           </a:p>
           <a:p>
             <a:pPr lvl="2"/>
             <a:r>
-              <a:rPr lang="en-US" smtClean="0"/>
+              <a:rPr lang="en-US"/>
               <a:t>Third level</a:t>
             </a:r>
           </a:p>
           <a:p>
             <a:pPr lvl="3"/>
             <a:r>
-              <a:rPr lang="en-US" smtClean="0"/>
+              <a:rPr lang="en-US"/>
               <a:t>Fourth level</a:t>
             </a:r>
           </a:p>
           <a:p>
             <a:pPr lvl="4"/>
             <a:r>
-              <a:rPr lang="en-US" smtClean="0"/>
+              <a:rPr lang="en-US"/>
               <a:t>Fifth level</a:t>
             </a:r>
-            <a:endParaRPr lang="en-US"/>
           </a:p>
         </p:txBody>
       </p:sp>
@@ -1764,7 +2202,7 @@
           <a:p>
             <a:fld id="{5BCAD085-E8A6-8845-BD4E-CB4CCA059FC4}" type="datetimeFigureOut">
               <a:rPr lang="en-US" smtClean="0"/>
-              <a:t>1/27/13</a:t>
+              <a:t>5/26/2024</a:t>
             </a:fld>
             <a:endParaRPr lang="en-US"/>
           </a:p>
@@ -1858,10 +2296,9 @@
           <a:lstStyle/>
           <a:p>
             <a:r>
-              <a:rPr lang="en-US" smtClean="0"/>
+              <a:rPr lang="en-US"/>
               <a:t>Click to edit Master title style</a:t>
             </a:r>
-            <a:endParaRPr lang="en-US"/>
           </a:p>
         </p:txBody>
       </p:sp>
@@ -1882,7 +2319,7 @@
           <a:p>
             <a:fld id="{5BCAD085-E8A6-8845-BD4E-CB4CCA059FC4}" type="datetimeFigureOut">
               <a:rPr lang="en-US" smtClean="0"/>
-              <a:t>1/27/13</a:t>
+              <a:t>5/26/2024</a:t>
             </a:fld>
             <a:endParaRPr lang="en-US"/>
           </a:p>
@@ -1977,7 +2414,7 @@
           <a:p>
             <a:fld id="{5BCAD085-E8A6-8845-BD4E-CB4CCA059FC4}" type="datetimeFigureOut">
               <a:rPr lang="en-US" smtClean="0"/>
-              <a:t>1/27/13</a:t>
+              <a:t>5/26/2024</a:t>
             </a:fld>
             <a:endParaRPr lang="en-US"/>
           </a:p>
@@ -2080,10 +2517,9 @@
           </a:lstStyle>
           <a:p>
             <a:r>
-              <a:rPr lang="en-US" smtClean="0"/>
+              <a:rPr lang="en-US"/>
               <a:t>Click to edit Master title style</a:t>
             </a:r>
-            <a:endParaRPr lang="en-US"/>
           </a:p>
         </p:txBody>
       </p:sp>
@@ -2137,38 +2573,37 @@
           <a:p>
             <a:pPr lvl="0"/>
             <a:r>
-              <a:rPr lang="en-US" smtClean="0"/>
+              <a:rPr lang="en-US"/>
               <a:t>Click to edit Master text styles</a:t>
             </a:r>
           </a:p>
           <a:p>
             <a:pPr lvl="1"/>
             <a:r>
-              <a:rPr lang="en-US" smtClean="0"/>
+              <a:rPr lang="en-US"/>
               <a:t>Second level</a:t>
             </a:r>
           </a:p>
           <a:p>
             <a:pPr lvl="2"/>
             <a:r>
-              <a:rPr lang="en-US" smtClean="0"/>
+              <a:rPr lang="en-US"/>
               <a:t>Third level</a:t>
             </a:r>
           </a:p>
           <a:p>
             <a:pPr lvl="3"/>
             <a:r>
-              <a:rPr lang="en-US" smtClean="0"/>
+              <a:rPr lang="en-US"/>
               <a:t>Fourth level</a:t>
             </a:r>
           </a:p>
           <a:p>
             <a:pPr lvl="4"/>
             <a:r>
-              <a:rPr lang="en-US" smtClean="0"/>
+              <a:rPr lang="en-US"/>
               <a:t>Fifth level</a:t>
             </a:r>
-            <a:endParaRPr lang="en-US"/>
           </a:p>
         </p:txBody>
       </p:sp>
@@ -2231,7 +2666,7 @@
           <a:p>
             <a:pPr lvl="0"/>
             <a:r>
-              <a:rPr lang="en-US" smtClean="0"/>
+              <a:rPr lang="en-US"/>
               <a:t>Click to edit Master text styles</a:t>
             </a:r>
           </a:p>
@@ -2254,7 +2689,7 @@
           <a:p>
             <a:fld id="{5BCAD085-E8A6-8845-BD4E-CB4CCA059FC4}" type="datetimeFigureOut">
               <a:rPr lang="en-US" smtClean="0"/>
-              <a:t>1/27/13</a:t>
+              <a:t>5/26/2024</a:t>
             </a:fld>
             <a:endParaRPr lang="en-US"/>
           </a:p>
@@ -2357,10 +2792,9 @@
           </a:lstStyle>
           <a:p>
             <a:r>
-              <a:rPr lang="en-US" smtClean="0"/>
+              <a:rPr lang="en-US"/>
               <a:t>Click to edit Master title style</a:t>
             </a:r>
-            <a:endParaRPr lang="en-US"/>
           </a:p>
         </p:txBody>
       </p:sp>
@@ -2484,7 +2918,7 @@
           <a:p>
             <a:pPr lvl="0"/>
             <a:r>
-              <a:rPr lang="en-US" smtClean="0"/>
+              <a:rPr lang="en-US"/>
               <a:t>Click to edit Master text styles</a:t>
             </a:r>
           </a:p>
@@ -2507,7 +2941,7 @@
           <a:p>
             <a:fld id="{5BCAD085-E8A6-8845-BD4E-CB4CCA059FC4}" type="datetimeFigureOut">
               <a:rPr lang="en-US" smtClean="0"/>
-              <a:t>1/27/13</a:t>
+              <a:t>5/26/2024</a:t>
             </a:fld>
             <a:endParaRPr lang="en-US"/>
           </a:p>
@@ -2616,10 +3050,9 @@
           <a:lstStyle/>
           <a:p>
             <a:r>
-              <a:rPr lang="en-US" smtClean="0"/>
+              <a:rPr lang="en-US"/>
               <a:t>Click to edit Master title style</a:t>
             </a:r>
-            <a:endParaRPr lang="en-US"/>
           </a:p>
         </p:txBody>
       </p:sp>
@@ -2650,38 +3083,37 @@
           <a:p>
             <a:pPr lvl="0"/>
             <a:r>
-              <a:rPr lang="en-US" smtClean="0"/>
+              <a:rPr lang="en-US"/>
               <a:t>Click to edit Master text styles</a:t>
             </a:r>
           </a:p>
           <a:p>
             <a:pPr lvl="1"/>
             <a:r>
-              <a:rPr lang="en-US" smtClean="0"/>
+              <a:rPr lang="en-US"/>
               <a:t>Second level</a:t>
             </a:r>
           </a:p>
           <a:p>
             <a:pPr lvl="2"/>
             <a:r>
-              <a:rPr lang="en-US" smtClean="0"/>
+              <a:rPr lang="en-US"/>
               <a:t>Third level</a:t>
             </a:r>
           </a:p>
           <a:p>
             <a:pPr lvl="3"/>
             <a:r>
-              <a:rPr lang="en-US" smtClean="0"/>
+              <a:rPr lang="en-US"/>
               <a:t>Fourth level</a:t>
             </a:r>
           </a:p>
           <a:p>
             <a:pPr lvl="4"/>
             <a:r>
-              <a:rPr lang="en-US" smtClean="0"/>
+              <a:rPr lang="en-US"/>
               <a:t>Fifth level</a:t>
             </a:r>
-            <a:endParaRPr lang="en-US"/>
           </a:p>
         </p:txBody>
       </p:sp>
@@ -2720,7 +3152,7 @@
           <a:p>
             <a:fld id="{5BCAD085-E8A6-8845-BD4E-CB4CCA059FC4}" type="datetimeFigureOut">
               <a:rPr lang="en-US" smtClean="0"/>
-              <a:t>1/27/13</a:t>
+              <a:t>5/26/2024</a:t>
             </a:fld>
             <a:endParaRPr lang="en-US"/>
           </a:p>
@@ -3079,7 +3511,7 @@
 </file>
 
 <file path=ppt/slides/slide1.xml><?xml version="1.0" encoding="utf-8"?>
-<p:sld xmlns:a="http://schemas.openxmlformats.org/drawingml/2006/main" xmlns:p="http://schemas.openxmlformats.org/presentationml/2006/main" xmlns:r="http://schemas.openxmlformats.org/officeDocument/2006/relationships">
+<p:sld xmlns:a="http://schemas.openxmlformats.org/drawingml/2006/main" xmlns:r="http://schemas.openxmlformats.org/officeDocument/2006/relationships" xmlns:p="http://schemas.openxmlformats.org/presentationml/2006/main">
   <p:cSld>
     <p:spTree>
       <p:nvGrpSpPr>
@@ -3087,7 +3519,14 @@
         <p:cNvGrpSpPr/>
         <p:nvPr/>
       </p:nvGrpSpPr>
-      <p:grpSpPr/>
+      <p:grpSpPr>
+        <a:xfrm>
+          <a:off x="0" y="0"/>
+          <a:ext cx="0" cy="0"/>
+          <a:chOff x="0" y="0"/>
+          <a:chExt cx="0" cy="0"/>
+        </a:xfrm>
+      </p:grpSpPr>
       <p:sp>
         <p:nvSpPr>
           <p:cNvPr id="2" name="Title 1"/>
@@ -3115,11 +3554,17 @@
           <p:cNvGraphicFramePr>
             <a:graphicFrameLocks noGrp="1"/>
           </p:cNvGraphicFramePr>
-          <p:nvPr/>
+          <p:nvPr>
+            <p:extLst>
+              <p:ext uri="{D42A27DB-BD31-4B8C-83A1-F6EECF244321}">
+                <p14:modId xmlns:p14="http://schemas.microsoft.com/office/powerpoint/2010/main" val="548949189"/>
+              </p:ext>
+            </p:extLst>
+          </p:nvPr>
         </p:nvGraphicFramePr>
         <p:xfrm>
-          <a:off x="1828800" y="1828800"/>
-          <a:ext cx="5486400" cy="731520"/>
+          <a:off x="457197" y="1544711"/>
+          <a:ext cx="8229603" cy="1150920"/>
         </p:xfrm>
         <a:graphic>
           <a:graphicData uri="http://schemas.openxmlformats.org/drawingml/2006/table">
@@ -3128,749 +3573,894 @@
                 <a:tableStyleId>{5C22544A-7EE6-4342-B048-85BDC9FD1C3A}</a:tableStyleId>
               </a:tblPr>
               <a:tblGrid>
-                <a:gridCol w="365760"/>
-                <a:gridCol w="365760"/>
-                <a:gridCol w="365760"/>
-                <a:gridCol w="365760"/>
-                <a:gridCol w="365760"/>
-                <a:gridCol w="365760"/>
-                <a:gridCol w="365760"/>
-                <a:gridCol w="365760"/>
-                <a:gridCol w="365760"/>
-                <a:gridCol w="365760"/>
-                <a:gridCol w="365760"/>
-                <a:gridCol w="365760"/>
-                <a:gridCol w="365760"/>
-                <a:gridCol w="365760"/>
-                <a:gridCol w="365760"/>
+                <a:gridCol w="1881432">
+                  <a:extLst>
+                    <a:ext uri="{9D8B030D-6E8A-4147-A177-3AD203B41FA5}">
+                      <a16:colId xmlns:a16="http://schemas.microsoft.com/office/drawing/2014/main" val="20000"/>
+                    </a:ext>
+                  </a:extLst>
+                </a:gridCol>
+                <a:gridCol w="1274370">
+                  <a:extLst>
+                    <a:ext uri="{9D8B030D-6E8A-4147-A177-3AD203B41FA5}">
+                      <a16:colId xmlns:a16="http://schemas.microsoft.com/office/drawing/2014/main" val="20002"/>
+                    </a:ext>
+                  </a:extLst>
+                </a:gridCol>
+                <a:gridCol w="408713">
+                  <a:extLst>
+                    <a:ext uri="{9D8B030D-6E8A-4147-A177-3AD203B41FA5}">
+                      <a16:colId xmlns:a16="http://schemas.microsoft.com/office/drawing/2014/main" val="1903184667"/>
+                    </a:ext>
+                  </a:extLst>
+                </a:gridCol>
+                <a:gridCol w="583136">
+                  <a:extLst>
+                    <a:ext uri="{9D8B030D-6E8A-4147-A177-3AD203B41FA5}">
+                      <a16:colId xmlns:a16="http://schemas.microsoft.com/office/drawing/2014/main" val="20003"/>
+                    </a:ext>
+                  </a:extLst>
+                </a:gridCol>
+                <a:gridCol w="583136">
+                  <a:extLst>
+                    <a:ext uri="{9D8B030D-6E8A-4147-A177-3AD203B41FA5}">
+                      <a16:colId xmlns:a16="http://schemas.microsoft.com/office/drawing/2014/main" val="20005"/>
+                    </a:ext>
+                  </a:extLst>
+                </a:gridCol>
+                <a:gridCol w="583136">
+                  <a:extLst>
+                    <a:ext uri="{9D8B030D-6E8A-4147-A177-3AD203B41FA5}">
+                      <a16:colId xmlns:a16="http://schemas.microsoft.com/office/drawing/2014/main" val="20006"/>
+                    </a:ext>
+                  </a:extLst>
+                </a:gridCol>
+                <a:gridCol w="583136">
+                  <a:extLst>
+                    <a:ext uri="{9D8B030D-6E8A-4147-A177-3AD203B41FA5}">
+                      <a16:colId xmlns:a16="http://schemas.microsoft.com/office/drawing/2014/main" val="20008"/>
+                    </a:ext>
+                  </a:extLst>
+                </a:gridCol>
+                <a:gridCol w="583136">
+                  <a:extLst>
+                    <a:ext uri="{9D8B030D-6E8A-4147-A177-3AD203B41FA5}">
+                      <a16:colId xmlns:a16="http://schemas.microsoft.com/office/drawing/2014/main" val="20009"/>
+                    </a:ext>
+                  </a:extLst>
+                </a:gridCol>
+                <a:gridCol w="583136">
+                  <a:extLst>
+                    <a:ext uri="{9D8B030D-6E8A-4147-A177-3AD203B41FA5}">
+                      <a16:colId xmlns:a16="http://schemas.microsoft.com/office/drawing/2014/main" val="20011"/>
+                    </a:ext>
+                  </a:extLst>
+                </a:gridCol>
+                <a:gridCol w="583136">
+                  <a:extLst>
+                    <a:ext uri="{9D8B030D-6E8A-4147-A177-3AD203B41FA5}">
+                      <a16:colId xmlns:a16="http://schemas.microsoft.com/office/drawing/2014/main" val="20012"/>
+                    </a:ext>
+                  </a:extLst>
+                </a:gridCol>
+                <a:gridCol w="583136">
+                  <a:extLst>
+                    <a:ext uri="{9D8B030D-6E8A-4147-A177-3AD203B41FA5}">
+                      <a16:colId xmlns:a16="http://schemas.microsoft.com/office/drawing/2014/main" val="20014"/>
+                    </a:ext>
+                  </a:extLst>
+                </a:gridCol>
               </a:tblGrid>
-              <a:tr h="182880">
+              <a:tr h="468000">
                 <a:tc>
                   <a:txBody>
                     <a:bodyPr/>
                     <a:lstStyle/>
                     <a:p>
-                      <a:r>
-                        <a:t>fund_name</a:t>
-                      </a:r>
+                      <a:pPr algn="l"/>
+                      <a:r>
+                        <a:rPr lang="en-GB" sz="900" dirty="0"/>
+                        <a:t>Fund Name</a:t>
+                      </a:r>
+                      <a:endParaRPr sz="900" dirty="0"/>
                     </a:p>
                   </a:txBody>
-                  <a:tcPr/>
+                  <a:tcPr anchor="ctr"/>
                 </a:tc>
                 <a:tc>
                   <a:txBody>
                     <a:bodyPr/>
                     <a:lstStyle/>
                     <a:p>
-                      <a:r>
-                        <a:t>ref_code</a:t>
-                      </a:r>
+                      <a:pPr algn="l"/>
+                      <a:r>
+                        <a:rPr lang="en-GB" sz="900" dirty="0"/>
+                        <a:t>Benchmark</a:t>
+                      </a:r>
+                      <a:endParaRPr sz="900" dirty="0"/>
                     </a:p>
                   </a:txBody>
-                  <a:tcPr/>
+                  <a:tcPr anchor="ctr"/>
                 </a:tc>
                 <a:tc>
                   <a:txBody>
                     <a:bodyPr/>
                     <a:lstStyle/>
                     <a:p>
-                      <a:r>
-                        <a:t>benchmark</a:t>
-                      </a:r>
+                      <a:pPr algn="l"/>
+                      <a:r>
+                        <a:rPr lang="en-GB" sz="900" dirty="0"/>
+                        <a:t>AM</a:t>
+                      </a:r>
+                    </a:p>
+                    <a:p>
+                      <a:pPr algn="l"/>
+                      <a:r>
+                        <a:rPr lang="en-GB" sz="900" dirty="0"/>
+                        <a:t>Ref</a:t>
+                      </a:r>
+                      <a:endParaRPr sz="900" dirty="0"/>
                     </a:p>
                   </a:txBody>
-                  <a:tcPr/>
+                  <a:tcPr anchor="ctr"/>
                 </a:tc>
                 <a:tc>
                   <a:txBody>
                     <a:bodyPr/>
                     <a:lstStyle/>
                     <a:p>
-                      <a:r>
-                        <a:t>3m_rtn_fund</a:t>
-                      </a:r>
+                      <a:pPr algn="r"/>
+                      <a:r>
+                        <a:rPr lang="en-GB" sz="900" dirty="0"/>
+                        <a:t>Fund</a:t>
+                      </a:r>
+                    </a:p>
+                    <a:p>
+                      <a:pPr algn="r"/>
+                      <a:r>
+                        <a:rPr lang="en-GB" sz="900" dirty="0"/>
+                        <a:t>3M</a:t>
+                      </a:r>
+                      <a:endParaRPr sz="900" dirty="0"/>
                     </a:p>
                   </a:txBody>
-                  <a:tcPr/>
+                  <a:tcPr anchor="ctr"/>
                 </a:tc>
                 <a:tc>
                   <a:txBody>
                     <a:bodyPr/>
                     <a:lstStyle/>
                     <a:p>
-                      <a:r>
-                        <a:t>3m_rtn_bm</a:t>
-                      </a:r>
+                      <a:pPr algn="r"/>
+                      <a:r>
+                        <a:rPr lang="en-GB" sz="900" dirty="0"/>
+                        <a:t>Rel</a:t>
+                      </a:r>
+                    </a:p>
+                    <a:p>
+                      <a:pPr algn="r"/>
+                      <a:r>
+                        <a:rPr lang="en-GB" sz="900" dirty="0"/>
+                        <a:t>3M</a:t>
+                      </a:r>
+                      <a:endParaRPr sz="900" dirty="0"/>
                     </a:p>
                   </a:txBody>
-                  <a:tcPr/>
+                  <a:tcPr anchor="ctr"/>
                 </a:tc>
                 <a:tc>
                   <a:txBody>
                     <a:bodyPr/>
                     <a:lstStyle/>
                     <a:p>
-                      <a:r>
-                        <a:t>3m_rtn_rel</a:t>
-                      </a:r>
+                      <a:pPr algn="r"/>
+                      <a:r>
+                        <a:rPr lang="en-GB" sz="900" dirty="0"/>
+                        <a:t>Fund </a:t>
+                      </a:r>
+                    </a:p>
+                    <a:p>
+                      <a:pPr algn="r"/>
+                      <a:r>
+                        <a:rPr lang="en-GB" sz="900" dirty="0"/>
+                        <a:t>1-Yr</a:t>
+                      </a:r>
+                      <a:endParaRPr sz="900" dirty="0"/>
                     </a:p>
                   </a:txBody>
-                  <a:tcPr/>
+                  <a:tcPr anchor="ctr"/>
                 </a:tc>
                 <a:tc>
                   <a:txBody>
                     <a:bodyPr/>
                     <a:lstStyle/>
                     <a:p>
-                      <a:r>
-                        <a:t>1yr_rtn_fund</a:t>
+                      <a:pPr marL="0" marR="0" lvl="0" indent="0" algn="r" defTabSz="457200" rtl="0" eaLnBrk="1" fontAlgn="auto" latinLnBrk="0" hangingPunct="1">
+                        <a:lnSpc>
+                          <a:spcPct val="100000"/>
+                        </a:lnSpc>
+                        <a:spcBef>
+                          <a:spcPts val="0"/>
+                        </a:spcBef>
+                        <a:spcAft>
+                          <a:spcPts val="0"/>
+                        </a:spcAft>
+                        <a:buClrTx/>
+                        <a:buSzTx/>
+                        <a:buFontTx/>
+                        <a:buNone/>
+                        <a:tabLst/>
+                        <a:defRPr/>
+                      </a:pPr>
+                      <a:r>
+                        <a:rPr lang="en-GB" sz="900" dirty="0"/>
+                        <a:t>Rel </a:t>
+                      </a:r>
+                    </a:p>
+                    <a:p>
+                      <a:pPr marL="0" marR="0" lvl="0" indent="0" algn="r" defTabSz="457200" rtl="0" eaLnBrk="1" fontAlgn="auto" latinLnBrk="0" hangingPunct="1">
+                        <a:lnSpc>
+                          <a:spcPct val="100000"/>
+                        </a:lnSpc>
+                        <a:spcBef>
+                          <a:spcPts val="0"/>
+                        </a:spcBef>
+                        <a:spcAft>
+                          <a:spcPts val="0"/>
+                        </a:spcAft>
+                        <a:buClrTx/>
+                        <a:buSzTx/>
+                        <a:buFontTx/>
+                        <a:buNone/>
+                        <a:tabLst/>
+                        <a:defRPr/>
+                      </a:pPr>
+                      <a:r>
+                        <a:rPr lang="en-GB" sz="900" dirty="0"/>
+                        <a:t>1-Yr</a:t>
                       </a:r>
                     </a:p>
                   </a:txBody>
-                  <a:tcPr/>
+                  <a:tcPr anchor="ctr"/>
                 </a:tc>
                 <a:tc>
                   <a:txBody>
                     <a:bodyPr/>
                     <a:lstStyle/>
                     <a:p>
-                      <a:r>
-                        <a:t>1yr_rtn_bm</a:t>
-                      </a:r>
+                      <a:pPr algn="r"/>
+                      <a:r>
+                        <a:rPr lang="en-GB" sz="900" dirty="0"/>
+                        <a:t>Fund </a:t>
+                      </a:r>
+                    </a:p>
+                    <a:p>
+                      <a:pPr algn="r"/>
+                      <a:r>
+                        <a:rPr lang="en-GB" sz="900" dirty="0"/>
+                        <a:t>3-Yr (p.a)</a:t>
+                      </a:r>
+                      <a:endParaRPr sz="900" dirty="0"/>
                     </a:p>
                   </a:txBody>
-                  <a:tcPr/>
+                  <a:tcPr anchor="ctr"/>
                 </a:tc>
                 <a:tc>
                   <a:txBody>
                     <a:bodyPr/>
                     <a:lstStyle/>
                     <a:p>
-                      <a:r>
-                        <a:t>1yr_rtn_rel</a:t>
+                      <a:pPr marL="0" marR="0" lvl="0" indent="0" algn="r" defTabSz="457200" rtl="0" eaLnBrk="1" fontAlgn="auto" latinLnBrk="0" hangingPunct="1">
+                        <a:lnSpc>
+                          <a:spcPct val="100000"/>
+                        </a:lnSpc>
+                        <a:spcBef>
+                          <a:spcPts val="0"/>
+                        </a:spcBef>
+                        <a:spcAft>
+                          <a:spcPts val="0"/>
+                        </a:spcAft>
+                        <a:buClrTx/>
+                        <a:buSzTx/>
+                        <a:buFontTx/>
+                        <a:buNone/>
+                        <a:tabLst/>
+                        <a:defRPr/>
+                      </a:pPr>
+                      <a:r>
+                        <a:rPr lang="en-GB" sz="900" dirty="0"/>
+                        <a:t>Rel</a:t>
+                      </a:r>
+                    </a:p>
+                    <a:p>
+                      <a:pPr marL="0" marR="0" lvl="0" indent="0" algn="r" defTabSz="457200" rtl="0" eaLnBrk="1" fontAlgn="auto" latinLnBrk="0" hangingPunct="1">
+                        <a:lnSpc>
+                          <a:spcPct val="100000"/>
+                        </a:lnSpc>
+                        <a:spcBef>
+                          <a:spcPts val="0"/>
+                        </a:spcBef>
+                        <a:spcAft>
+                          <a:spcPts val="0"/>
+                        </a:spcAft>
+                        <a:buClrTx/>
+                        <a:buSzTx/>
+                        <a:buFontTx/>
+                        <a:buNone/>
+                        <a:tabLst/>
+                        <a:defRPr/>
+                      </a:pPr>
+                      <a:r>
+                        <a:rPr lang="en-GB" sz="900" dirty="0"/>
+                        <a:t>3-Yr (p.a)</a:t>
                       </a:r>
                     </a:p>
                   </a:txBody>
-                  <a:tcPr/>
+                  <a:tcPr anchor="ctr"/>
                 </a:tc>
                 <a:tc>
                   <a:txBody>
                     <a:bodyPr/>
                     <a:lstStyle/>
                     <a:p>
-                      <a:r>
-                        <a:t>3yr_rtn_fund</a:t>
-                      </a:r>
+                      <a:pPr algn="r"/>
+                      <a:r>
+                        <a:rPr lang="en-GB" sz="900" dirty="0"/>
+                        <a:t>Fund </a:t>
+                      </a:r>
+                    </a:p>
+                    <a:p>
+                      <a:pPr algn="r"/>
+                      <a:r>
+                        <a:rPr lang="en-GB" sz="900" dirty="0"/>
+                        <a:t>5-Yr (p.a)</a:t>
+                      </a:r>
+                      <a:endParaRPr sz="900" dirty="0"/>
                     </a:p>
                   </a:txBody>
-                  <a:tcPr/>
+                  <a:tcPr anchor="ctr"/>
                 </a:tc>
                 <a:tc>
                   <a:txBody>
                     <a:bodyPr/>
                     <a:lstStyle/>
                     <a:p>
-                      <a:r>
-                        <a:t>3yr_rtn_bm</a:t>
+                      <a:pPr marL="0" marR="0" lvl="0" indent="0" algn="r" defTabSz="457200" rtl="0" eaLnBrk="1" fontAlgn="auto" latinLnBrk="0" hangingPunct="1">
+                        <a:lnSpc>
+                          <a:spcPct val="100000"/>
+                        </a:lnSpc>
+                        <a:spcBef>
+                          <a:spcPts val="0"/>
+                        </a:spcBef>
+                        <a:spcAft>
+                          <a:spcPts val="0"/>
+                        </a:spcAft>
+                        <a:buClrTx/>
+                        <a:buSzTx/>
+                        <a:buFontTx/>
+                        <a:buNone/>
+                        <a:tabLst/>
+                        <a:defRPr/>
+                      </a:pPr>
+                      <a:r>
+                        <a:rPr lang="en-GB" sz="900" dirty="0"/>
+                        <a:t>Rel </a:t>
+                      </a:r>
+                    </a:p>
+                    <a:p>
+                      <a:pPr marL="0" marR="0" lvl="0" indent="0" algn="r" defTabSz="457200" rtl="0" eaLnBrk="1" fontAlgn="auto" latinLnBrk="0" hangingPunct="1">
+                        <a:lnSpc>
+                          <a:spcPct val="100000"/>
+                        </a:lnSpc>
+                        <a:spcBef>
+                          <a:spcPts val="0"/>
+                        </a:spcBef>
+                        <a:spcAft>
+                          <a:spcPts val="0"/>
+                        </a:spcAft>
+                        <a:buClrTx/>
+                        <a:buSzTx/>
+                        <a:buFontTx/>
+                        <a:buNone/>
+                        <a:tabLst/>
+                        <a:defRPr/>
+                      </a:pPr>
+                      <a:r>
+                        <a:rPr lang="en-GB" sz="900" dirty="0"/>
+                        <a:t>5-Yr (p.a)</a:t>
                       </a:r>
                     </a:p>
                   </a:txBody>
-                  <a:tcPr/>
+                  <a:tcPr anchor="ctr"/>
+                </a:tc>
+                <a:extLst>
+                  <a:ext uri="{0D108BD9-81ED-4DB2-BD59-A6C34878D82A}">
+                    <a16:rowId xmlns:a16="http://schemas.microsoft.com/office/drawing/2014/main" val="10000"/>
+                  </a:ext>
+                </a:extLst>
+              </a:tr>
+              <a:tr h="216000">
+                <a:tc>
+                  <a:txBody>
+                    <a:bodyPr/>
+                    <a:lstStyle/>
+                    <a:p>
+                      <a:pPr algn="l"/>
+                      <a:r>
+                        <a:rPr sz="800" dirty="0"/>
+                        <a:t>Fund X</a:t>
+                      </a:r>
+                    </a:p>
+                  </a:txBody>
+                  <a:tcPr anchor="ctr"/>
                 </a:tc>
                 <a:tc>
                   <a:txBody>
                     <a:bodyPr/>
                     <a:lstStyle/>
                     <a:p>
-                      <a:r>
-                        <a:t>3yr_rtn_rel</a:t>
+                      <a:pPr algn="l"/>
+                      <a:r>
+                        <a:rPr sz="800" dirty="0"/>
+                        <a:t>UK Equity Index</a:t>
                       </a:r>
                     </a:p>
                   </a:txBody>
-                  <a:tcPr/>
+                  <a:tcPr anchor="ctr"/>
                 </a:tc>
                 <a:tc>
                   <a:txBody>
                     <a:bodyPr/>
                     <a:lstStyle/>
                     <a:p>
-                      <a:r>
-                        <a:t>5yr_rtn_fund</a:t>
+                      <a:pPr algn="l"/>
+                      <a:r>
+                        <a:rPr sz="800" dirty="0"/>
+                        <a:t>amc1</a:t>
                       </a:r>
                     </a:p>
                   </a:txBody>
-                  <a:tcPr/>
+                  <a:tcPr anchor="ctr"/>
                 </a:tc>
                 <a:tc>
                   <a:txBody>
                     <a:bodyPr/>
                     <a:lstStyle/>
                     <a:p>
-                      <a:r>
-                        <a:t>5yr_rtn_bm</a:t>
+                      <a:pPr algn="r"/>
+                      <a:r>
+                        <a:rPr sz="800" dirty="0"/>
+                        <a:t>2.0%</a:t>
                       </a:r>
                     </a:p>
                   </a:txBody>
-                  <a:tcPr/>
+                  <a:tcPr anchor="ctr"/>
                 </a:tc>
                 <a:tc>
                   <a:txBody>
                     <a:bodyPr/>
                     <a:lstStyle/>
                     <a:p>
-                      <a:r>
-                        <a:t>5yr_rtn_rel</a:t>
+                      <a:pPr algn="r"/>
+                      <a:r>
+                        <a:rPr sz="800" dirty="0"/>
+                        <a:t>0.0%</a:t>
                       </a:r>
                     </a:p>
                   </a:txBody>
-                  <a:tcPr/>
-                </a:tc>
-              </a:tr>
-              <a:tr h="182880">
-                <a:tc>
-                  <a:txBody>
-                    <a:bodyPr/>
-                    <a:lstStyle/>
-                    <a:p>
-                      <a:r>
-                        <a:t>Fund X</a:t>
-                      </a:r>
-                    </a:p>
-                  </a:txBody>
-                  <a:tcPr/>
+                  <a:tcPr anchor="ctr"/>
                 </a:tc>
                 <a:tc>
                   <a:txBody>
                     <a:bodyPr/>
                     <a:lstStyle/>
                     <a:p>
-                      <a:r>
-                        <a:t>amc1</a:t>
+                      <a:pPr algn="r"/>
+                      <a:r>
+                        <a:rPr sz="800" dirty="0"/>
+                        <a:t>3.0%</a:t>
                       </a:r>
                     </a:p>
                   </a:txBody>
-                  <a:tcPr/>
+                  <a:tcPr anchor="ctr"/>
                 </a:tc>
                 <a:tc>
                   <a:txBody>
                     <a:bodyPr/>
                     <a:lstStyle/>
                     <a:p>
-                      <a:r>
-                        <a:t>UK Equity Index</a:t>
+                      <a:pPr algn="r"/>
+                      <a:r>
+                        <a:rPr sz="800" dirty="0"/>
+                        <a:t>-1.0%</a:t>
                       </a:r>
                     </a:p>
                   </a:txBody>
-                  <a:tcPr/>
+                  <a:tcPr anchor="ctr"/>
                 </a:tc>
                 <a:tc>
                   <a:txBody>
                     <a:bodyPr/>
                     <a:lstStyle/>
                     <a:p>
-                      <a:r>
-                        <a:t>2.0%</a:t>
+                      <a:pPr algn="r"/>
+                      <a:r>
+                        <a:rPr sz="800" dirty="0"/>
+                        <a:t>5.0%</a:t>
                       </a:r>
                     </a:p>
                   </a:txBody>
-                  <a:tcPr/>
+                  <a:tcPr anchor="ctr"/>
                 </a:tc>
                 <a:tc>
                   <a:txBody>
                     <a:bodyPr/>
                     <a:lstStyle/>
                     <a:p>
-                      <a:r>
-                        <a:t>2.0%</a:t>
+                      <a:pPr algn="r"/>
+                      <a:r>
+                        <a:rPr sz="800"/>
+                        <a:t>1.0%</a:t>
                       </a:r>
                     </a:p>
                   </a:txBody>
-                  <a:tcPr/>
+                  <a:tcPr anchor="ctr"/>
                 </a:tc>
                 <a:tc>
                   <a:txBody>
                     <a:bodyPr/>
                     <a:lstStyle/>
                     <a:p>
-                      <a:r>
-                        <a:t>0.0%</a:t>
+                      <a:pPr algn="r"/>
+                      <a:r>
+                        <a:rPr sz="800"/>
+                        <a:t>2.0%</a:t>
                       </a:r>
                     </a:p>
                   </a:txBody>
-                  <a:tcPr/>
+                  <a:tcPr anchor="ctr"/>
                 </a:tc>
                 <a:tc>
                   <a:txBody>
                     <a:bodyPr/>
                     <a:lstStyle/>
                     <a:p>
-                      <a:r>
-                        <a:t>3.0%</a:t>
+                      <a:pPr algn="r"/>
+                      <a:r>
+                        <a:rPr sz="800" dirty="0"/>
+                        <a:t>-1.0%</a:t>
                       </a:r>
                     </a:p>
                   </a:txBody>
-                  <a:tcPr/>
+                  <a:tcPr anchor="ctr"/>
+                </a:tc>
+                <a:extLst>
+                  <a:ext uri="{0D108BD9-81ED-4DB2-BD59-A6C34878D82A}">
+                    <a16:rowId xmlns:a16="http://schemas.microsoft.com/office/drawing/2014/main" val="10001"/>
+                  </a:ext>
+                </a:extLst>
+              </a:tr>
+              <a:tr h="216000">
+                <a:tc>
+                  <a:txBody>
+                    <a:bodyPr/>
+                    <a:lstStyle/>
+                    <a:p>
+                      <a:pPr algn="l"/>
+                      <a:r>
+                        <a:rPr sz="800" dirty="0"/>
+                        <a:t>Fund Y</a:t>
+                      </a:r>
+                    </a:p>
+                  </a:txBody>
+                  <a:tcPr anchor="ctr"/>
                 </a:tc>
                 <a:tc>
                   <a:txBody>
                     <a:bodyPr/>
                     <a:lstStyle/>
                     <a:p>
-                      <a:r>
-                        <a:t>4.0%</a:t>
+                      <a:pPr algn="l"/>
+                      <a:r>
+                        <a:rPr sz="800" dirty="0"/>
+                        <a:t>US Equity Index</a:t>
                       </a:r>
                     </a:p>
                   </a:txBody>
-                  <a:tcPr/>
+                  <a:tcPr anchor="ctr"/>
                 </a:tc>
                 <a:tc>
                   <a:txBody>
                     <a:bodyPr/>
                     <a:lstStyle/>
                     <a:p>
-                      <a:r>
-                        <a:t>-1.0%</a:t>
+                      <a:pPr algn="l"/>
+                      <a:r>
+                        <a:rPr sz="800" dirty="0"/>
+                        <a:t>amc2</a:t>
                       </a:r>
                     </a:p>
                   </a:txBody>
-                  <a:tcPr/>
+                  <a:tcPr anchor="ctr"/>
                 </a:tc>
                 <a:tc>
                   <a:txBody>
                     <a:bodyPr/>
                     <a:lstStyle/>
                     <a:p>
-                      <a:r>
-                        <a:t>5.0%</a:t>
+                      <a:pPr algn="r"/>
+                      <a:r>
+                        <a:rPr sz="800" dirty="0"/>
+                        <a:t>9.0%</a:t>
                       </a:r>
                     </a:p>
                   </a:txBody>
-                  <a:tcPr/>
+                  <a:tcPr anchor="ctr"/>
                 </a:tc>
                 <a:tc>
                   <a:txBody>
                     <a:bodyPr/>
                     <a:lstStyle/>
                     <a:p>
-                      <a:r>
-                        <a:t>4.0%</a:t>
+                      <a:pPr algn="r"/>
+                      <a:r>
+                        <a:rPr sz="800" dirty="0"/>
+                        <a:t>3.8%</a:t>
                       </a:r>
                     </a:p>
                   </a:txBody>
-                  <a:tcPr/>
+                  <a:tcPr anchor="ctr"/>
                 </a:tc>
                 <a:tc>
                   <a:txBody>
                     <a:bodyPr/>
                     <a:lstStyle/>
                     <a:p>
-                      <a:r>
-                        <a:t>1.0%</a:t>
+                      <a:pPr algn="r"/>
+                      <a:r>
+                        <a:rPr sz="800" dirty="0"/>
+                        <a:t>7.0%</a:t>
                       </a:r>
                     </a:p>
                   </a:txBody>
-                  <a:tcPr/>
+                  <a:tcPr anchor="ctr"/>
                 </a:tc>
                 <a:tc>
                   <a:txBody>
                     <a:bodyPr/>
                     <a:lstStyle/>
                     <a:p>
-                      <a:r>
-                        <a:t>2.0%</a:t>
+                      <a:pPr algn="r"/>
+                      <a:r>
+                        <a:rPr sz="800" dirty="0"/>
+                        <a:t>5.9%</a:t>
                       </a:r>
                     </a:p>
                   </a:txBody>
-                  <a:tcPr/>
+                  <a:tcPr anchor="ctr"/>
                 </a:tc>
                 <a:tc>
                   <a:txBody>
                     <a:bodyPr/>
                     <a:lstStyle/>
                     <a:p>
-                      <a:r>
-                        <a:t>3.0%</a:t>
+                      <a:pPr algn="r"/>
+                      <a:r>
+                        <a:rPr sz="800" dirty="0"/>
+                        <a:t>8.0%</a:t>
                       </a:r>
                     </a:p>
                   </a:txBody>
-                  <a:tcPr/>
+                  <a:tcPr anchor="ctr"/>
                 </a:tc>
                 <a:tc>
                   <a:txBody>
                     <a:bodyPr/>
                     <a:lstStyle/>
                     <a:p>
-                      <a:r>
-                        <a:t>-1.0%</a:t>
+                      <a:pPr algn="r"/>
+                      <a:r>
+                        <a:rPr sz="800" dirty="0"/>
+                        <a:t>-0.9%</a:t>
                       </a:r>
                     </a:p>
                   </a:txBody>
-                  <a:tcPr/>
-                </a:tc>
-              </a:tr>
-              <a:tr h="182880">
-                <a:tc>
-                  <a:txBody>
-                    <a:bodyPr/>
-                    <a:lstStyle/>
-                    <a:p>
-                      <a:r>
-                        <a:t>Fund Y</a:t>
-                      </a:r>
-                    </a:p>
-                  </a:txBody>
-                  <a:tcPr/>
+                  <a:tcPr anchor="ctr"/>
                 </a:tc>
                 <a:tc>
                   <a:txBody>
                     <a:bodyPr/>
                     <a:lstStyle/>
                     <a:p>
-                      <a:r>
-                        <a:t>amc2</a:t>
+                      <a:pPr algn="r"/>
+                      <a:r>
+                        <a:rPr sz="800" dirty="0"/>
+                        <a:t>4.0%</a:t>
                       </a:r>
                     </a:p>
                   </a:txBody>
-                  <a:tcPr/>
+                  <a:tcPr anchor="ctr"/>
                 </a:tc>
                 <a:tc>
                   <a:txBody>
                     <a:bodyPr/>
                     <a:lstStyle/>
                     <a:p>
-                      <a:r>
-                        <a:t>US Equity Index</a:t>
+                      <a:pPr algn="r"/>
+                      <a:r>
+                        <a:rPr sz="800" dirty="0"/>
+                        <a:t>-2.8%</a:t>
                       </a:r>
                     </a:p>
                   </a:txBody>
-                  <a:tcPr/>
+                  <a:tcPr anchor="ctr"/>
+                </a:tc>
+                <a:extLst>
+                  <a:ext uri="{0D108BD9-81ED-4DB2-BD59-A6C34878D82A}">
+                    <a16:rowId xmlns:a16="http://schemas.microsoft.com/office/drawing/2014/main" val="10002"/>
+                  </a:ext>
+                </a:extLst>
+              </a:tr>
+              <a:tr h="216000">
+                <a:tc>
+                  <a:txBody>
+                    <a:bodyPr/>
+                    <a:lstStyle/>
+                    <a:p>
+                      <a:pPr algn="l"/>
+                      <a:r>
+                        <a:rPr sz="800"/>
+                        <a:t>Fund Z</a:t>
+                      </a:r>
+                    </a:p>
+                  </a:txBody>
+                  <a:tcPr anchor="ctr"/>
                 </a:tc>
                 <a:tc>
                   <a:txBody>
                     <a:bodyPr/>
                     <a:lstStyle/>
                     <a:p>
-                      <a:r>
-                        <a:t>9.0%</a:t>
+                      <a:pPr algn="l"/>
+                      <a:r>
+                        <a:rPr sz="800" dirty="0"/>
+                        <a:t>Global Fixed Income Index</a:t>
                       </a:r>
                     </a:p>
                   </a:txBody>
-                  <a:tcPr/>
+                  <a:tcPr anchor="ctr"/>
                 </a:tc>
                 <a:tc>
                   <a:txBody>
                     <a:bodyPr/>
                     <a:lstStyle/>
                     <a:p>
-                      <a:r>
-                        <a:t>5.0%</a:t>
+                      <a:pPr algn="l"/>
+                      <a:r>
+                        <a:rPr sz="800" dirty="0"/>
+                        <a:t>amc3</a:t>
                       </a:r>
                     </a:p>
                   </a:txBody>
-                  <a:tcPr/>
+                  <a:tcPr anchor="ctr"/>
                 </a:tc>
                 <a:tc>
                   <a:txBody>
                     <a:bodyPr/>
                     <a:lstStyle/>
                     <a:p>
-                      <a:r>
-                        <a:t>3.8%</a:t>
+                      <a:pPr algn="r"/>
+                      <a:r>
+                        <a:rPr sz="800" dirty="0"/>
+                        <a:t>10.0%</a:t>
                       </a:r>
                     </a:p>
                   </a:txBody>
-                  <a:tcPr/>
+                  <a:tcPr anchor="ctr"/>
                 </a:tc>
                 <a:tc>
                   <a:txBody>
                     <a:bodyPr/>
                     <a:lstStyle/>
                     <a:p>
-                      <a:r>
-                        <a:t>7.0%</a:t>
+                      <a:pPr algn="r"/>
+                      <a:r>
+                        <a:rPr sz="800" dirty="0"/>
+                        <a:t>1.9%</a:t>
                       </a:r>
                     </a:p>
                   </a:txBody>
-                  <a:tcPr/>
+                  <a:tcPr anchor="ctr"/>
                 </a:tc>
                 <a:tc>
                   <a:txBody>
                     <a:bodyPr/>
                     <a:lstStyle/>
                     <a:p>
-                      <a:r>
-                        <a:t>1.0%</a:t>
+                      <a:pPr algn="r"/>
+                      <a:r>
+                        <a:rPr sz="800" dirty="0"/>
+                        <a:t>4.0%</a:t>
                       </a:r>
                     </a:p>
                   </a:txBody>
-                  <a:tcPr/>
+                  <a:tcPr anchor="ctr"/>
                 </a:tc>
                 <a:tc>
                   <a:txBody>
                     <a:bodyPr/>
                     <a:lstStyle/>
                     <a:p>
-                      <a:r>
-                        <a:t>5.9%</a:t>
+                      <a:pPr algn="r"/>
+                      <a:r>
+                        <a:rPr sz="800" dirty="0"/>
+                        <a:t>-3.7%</a:t>
                       </a:r>
                     </a:p>
                   </a:txBody>
-                  <a:tcPr/>
+                  <a:tcPr anchor="ctr"/>
                 </a:tc>
                 <a:tc>
                   <a:txBody>
                     <a:bodyPr/>
                     <a:lstStyle/>
                     <a:p>
-                      <a:r>
-                        <a:t>8.0%</a:t>
+                      <a:pPr algn="r"/>
+                      <a:r>
+                        <a:rPr sz="800" dirty="0"/>
+                        <a:t>5.0%</a:t>
                       </a:r>
                     </a:p>
                   </a:txBody>
-                  <a:tcPr/>
+                  <a:tcPr anchor="ctr"/>
                 </a:tc>
                 <a:tc>
                   <a:txBody>
                     <a:bodyPr/>
                     <a:lstStyle/>
                     <a:p>
-                      <a:r>
-                        <a:t>9.0%</a:t>
+                      <a:pPr algn="r"/>
+                      <a:r>
+                        <a:rPr sz="800" dirty="0"/>
+                        <a:t>4.0%</a:t>
                       </a:r>
                     </a:p>
                   </a:txBody>
-                  <a:tcPr/>
+                  <a:tcPr anchor="ctr"/>
                 </a:tc>
                 <a:tc>
                   <a:txBody>
                     <a:bodyPr/>
                     <a:lstStyle/>
                     <a:p>
-                      <a:r>
-                        <a:t>-0.9%</a:t>
+                      <a:pPr algn="r"/>
+                      <a:r>
+                        <a:rPr sz="800" dirty="0"/>
+                        <a:t>4.0%</a:t>
                       </a:r>
                     </a:p>
                   </a:txBody>
-                  <a:tcPr/>
+                  <a:tcPr anchor="ctr"/>
                 </a:tc>
                 <a:tc>
                   <a:txBody>
                     <a:bodyPr/>
                     <a:lstStyle/>
                     <a:p>
-                      <a:r>
-                        <a:t>4.0%</a:t>
+                      <a:pPr algn="r"/>
+                      <a:r>
+                        <a:rPr sz="800" dirty="0"/>
+                        <a:t>-0.9%</a:t>
                       </a:r>
                     </a:p>
                   </a:txBody>
-                  <a:tcPr/>
+                  <a:tcPr anchor="ctr"/>
                 </a:tc>
-                <a:tc>
-                  <a:txBody>
-                    <a:bodyPr/>
-                    <a:lstStyle/>
-                    <a:p>
-                      <a:r>
-                        <a:t>7.0%</a:t>
-                      </a:r>
-                    </a:p>
-                  </a:txBody>
-                  <a:tcPr/>
-                </a:tc>
-                <a:tc>
-                  <a:txBody>
-                    <a:bodyPr/>
-                    <a:lstStyle/>
-                    <a:p>
-                      <a:r>
-                        <a:t>-2.8%</a:t>
-                      </a:r>
-                    </a:p>
-                  </a:txBody>
-                  <a:tcPr/>
-                </a:tc>
-              </a:tr>
-              <a:tr h="182880">
-                <a:tc>
-                  <a:txBody>
-                    <a:bodyPr/>
-                    <a:lstStyle/>
-                    <a:p>
-                      <a:r>
-                        <a:t>Fund Z</a:t>
-                      </a:r>
-                    </a:p>
-                  </a:txBody>
-                  <a:tcPr/>
-                </a:tc>
-                <a:tc>
-                  <a:txBody>
-                    <a:bodyPr/>
-                    <a:lstStyle/>
-                    <a:p>
-                      <a:r>
-                        <a:t>amc3</a:t>
-                      </a:r>
-                    </a:p>
-                  </a:txBody>
-                  <a:tcPr/>
-                </a:tc>
-                <a:tc>
-                  <a:txBody>
-                    <a:bodyPr/>
-                    <a:lstStyle/>
-                    <a:p>
-                      <a:r>
-                        <a:t>Global Fixed Income Index</a:t>
-                      </a:r>
-                    </a:p>
-                  </a:txBody>
-                  <a:tcPr/>
-                </a:tc>
-                <a:tc>
-                  <a:txBody>
-                    <a:bodyPr/>
-                    <a:lstStyle/>
-                    <a:p>
-                      <a:r>
-                        <a:t>10.0%</a:t>
-                      </a:r>
-                    </a:p>
-                  </a:txBody>
-                  <a:tcPr/>
-                </a:tc>
-                <a:tc>
-                  <a:txBody>
-                    <a:bodyPr/>
-                    <a:lstStyle/>
-                    <a:p>
-                      <a:r>
-                        <a:t>8.0%</a:t>
-                      </a:r>
-                    </a:p>
-                  </a:txBody>
-                  <a:tcPr/>
-                </a:tc>
-                <a:tc>
-                  <a:txBody>
-                    <a:bodyPr/>
-                    <a:lstStyle/>
-                    <a:p>
-                      <a:r>
-                        <a:t>1.9%</a:t>
-                      </a:r>
-                    </a:p>
-                  </a:txBody>
-                  <a:tcPr/>
-                </a:tc>
-                <a:tc>
-                  <a:txBody>
-                    <a:bodyPr/>
-                    <a:lstStyle/>
-                    <a:p>
-                      <a:r>
-                        <a:t>4.0%</a:t>
-                      </a:r>
-                    </a:p>
-                  </a:txBody>
-                  <a:tcPr/>
-                </a:tc>
-                <a:tc>
-                  <a:txBody>
-                    <a:bodyPr/>
-                    <a:lstStyle/>
-                    <a:p>
-                      <a:r>
-                        <a:t>8.0%</a:t>
-                      </a:r>
-                    </a:p>
-                  </a:txBody>
-                  <a:tcPr/>
-                </a:tc>
-                <a:tc>
-                  <a:txBody>
-                    <a:bodyPr/>
-                    <a:lstStyle/>
-                    <a:p>
-                      <a:r>
-                        <a:t>-3.7%</a:t>
-                      </a:r>
-                    </a:p>
-                  </a:txBody>
-                  <a:tcPr/>
-                </a:tc>
-                <a:tc>
-                  <a:txBody>
-                    <a:bodyPr/>
-                    <a:lstStyle/>
-                    <a:p>
-                      <a:r>
-                        <a:t>5.0%</a:t>
-                      </a:r>
-                    </a:p>
-                  </a:txBody>
-                  <a:tcPr/>
-                </a:tc>
-                <a:tc>
-                  <a:txBody>
-                    <a:bodyPr/>
-                    <a:lstStyle/>
-                    <a:p>
-                      <a:r>
-                        <a:t>1.0%</a:t>
-                      </a:r>
-                    </a:p>
-                  </a:txBody>
-                  <a:tcPr/>
-                </a:tc>
-                <a:tc>
-                  <a:txBody>
-                    <a:bodyPr/>
-                    <a:lstStyle/>
-                    <a:p>
-                      <a:r>
-                        <a:t>4.0%</a:t>
-                      </a:r>
-                    </a:p>
-                  </a:txBody>
-                  <a:tcPr/>
-                </a:tc>
-                <a:tc>
-                  <a:txBody>
-                    <a:bodyPr/>
-                    <a:lstStyle/>
-                    <a:p>
-                      <a:r>
-                        <a:t>4.0%</a:t>
-                      </a:r>
-                    </a:p>
-                  </a:txBody>
-                  <a:tcPr/>
-                </a:tc>
-                <a:tc>
-                  <a:txBody>
-                    <a:bodyPr/>
-                    <a:lstStyle/>
-                    <a:p>
-                      <a:r>
-                        <a:t>5.0%</a:t>
-                      </a:r>
-                    </a:p>
-                  </a:txBody>
-                  <a:tcPr/>
-                </a:tc>
-                <a:tc>
-                  <a:txBody>
-                    <a:bodyPr/>
-                    <a:lstStyle/>
-                    <a:p>
-                      <a:r>
-                        <a:t>-0.9%</a:t>
-                      </a:r>
-                    </a:p>
-                  </a:txBody>
-                  <a:tcPr/>
-                </a:tc>
+                <a:extLst>
+                  <a:ext uri="{0D108BD9-81ED-4DB2-BD59-A6C34878D82A}">
+                    <a16:rowId xmlns:a16="http://schemas.microsoft.com/office/drawing/2014/main" val="10003"/>
+                  </a:ext>
+                </a:extLst>
               </a:tr>
             </a:tbl>
           </a:graphicData>
@@ -4202,4 +4792,299 @@
   </a:objectDefaults>
   <a:extraClrSchemeLst/>
 </a:theme>
+</file>
+
+<file path=ppt/theme/theme2.xml><?xml version="1.0" encoding="utf-8"?>
+<a:theme xmlns:a="http://schemas.openxmlformats.org/drawingml/2006/main" name="Office Theme">
+  <a:themeElements>
+    <a:clrScheme name="Office">
+      <a:dk1>
+        <a:sysClr val="windowText" lastClr="000000"/>
+      </a:dk1>
+      <a:lt1>
+        <a:sysClr val="window" lastClr="FFFFFF"/>
+      </a:lt1>
+      <a:dk2>
+        <a:srgbClr val="44546A"/>
+      </a:dk2>
+      <a:lt2>
+        <a:srgbClr val="E7E6E6"/>
+      </a:lt2>
+      <a:accent1>
+        <a:srgbClr val="4472C4"/>
+      </a:accent1>
+      <a:accent2>
+        <a:srgbClr val="ED7D31"/>
+      </a:accent2>
+      <a:accent3>
+        <a:srgbClr val="A5A5A5"/>
+      </a:accent3>
+      <a:accent4>
+        <a:srgbClr val="FFC000"/>
+      </a:accent4>
+      <a:accent5>
+        <a:srgbClr val="5B9BD5"/>
+      </a:accent5>
+      <a:accent6>
+        <a:srgbClr val="70AD47"/>
+      </a:accent6>
+      <a:hlink>
+        <a:srgbClr val="0563C1"/>
+      </a:hlink>
+      <a:folHlink>
+        <a:srgbClr val="954F72"/>
+      </a:folHlink>
+    </a:clrScheme>
+    <a:fontScheme name="Office">
+      <a:majorFont>
+        <a:latin typeface="Calibri Light" panose="020F0302020204030204"/>
+        <a:ea typeface=""/>
+        <a:cs typeface=""/>
+        <a:font script="Jpan" typeface="游ゴシック Light"/>
+        <a:font script="Hang" typeface="맑은 고딕"/>
+        <a:font script="Hans" typeface="等线 Light"/>
+        <a:font script="Hant" typeface="新細明體"/>
+        <a:font script="Arab" typeface="Times New Roman"/>
+        <a:font script="Hebr" typeface="Times New Roman"/>
+        <a:font script="Thai" typeface="Angsana New"/>
+        <a:font script="Ethi" typeface="Nyala"/>
+        <a:font script="Beng" typeface="Vrinda"/>
+        <a:font script="Gujr" typeface="Shruti"/>
+        <a:font script="Khmr" typeface="MoolBoran"/>
+        <a:font script="Knda" typeface="Tunga"/>
+        <a:font script="Guru" typeface="Raavi"/>
+        <a:font script="Cans" typeface="Euphemia"/>
+        <a:font script="Cher" typeface="Plantagenet Cherokee"/>
+        <a:font script="Yiii" typeface="Microsoft Yi Baiti"/>
+        <a:font script="Tibt" typeface="Microsoft Himalaya"/>
+        <a:font script="Thaa" typeface="MV Boli"/>
+        <a:font script="Deva" typeface="Mangal"/>
+        <a:font script="Telu" typeface="Gautami"/>
+        <a:font script="Taml" typeface="Latha"/>
+        <a:font script="Syrc" typeface="Estrangelo Edessa"/>
+        <a:font script="Orya" typeface="Kalinga"/>
+        <a:font script="Mlym" typeface="Kartika"/>
+        <a:font script="Laoo" typeface="DokChampa"/>
+        <a:font script="Sinh" typeface="Iskoola Pota"/>
+        <a:font script="Mong" typeface="Mongolian Baiti"/>
+        <a:font script="Viet" typeface="Times New Roman"/>
+        <a:font script="Uigh" typeface="Microsoft Uighur"/>
+        <a:font script="Geor" typeface="Sylfaen"/>
+        <a:font script="Armn" typeface="Arial"/>
+        <a:font script="Bugi" typeface="Leelawadee UI"/>
+        <a:font script="Bopo" typeface="Microsoft JhengHei"/>
+        <a:font script="Java" typeface="Javanese Text"/>
+        <a:font script="Lisu" typeface="Segoe UI"/>
+        <a:font script="Mymr" typeface="Myanmar Text"/>
+        <a:font script="Nkoo" typeface="Ebrima"/>
+        <a:font script="Olck" typeface="Nirmala UI"/>
+        <a:font script="Osma" typeface="Ebrima"/>
+        <a:font script="Phag" typeface="Phagspa"/>
+        <a:font script="Syrn" typeface="Estrangelo Edessa"/>
+        <a:font script="Syrj" typeface="Estrangelo Edessa"/>
+        <a:font script="Syre" typeface="Estrangelo Edessa"/>
+        <a:font script="Sora" typeface="Nirmala UI"/>
+        <a:font script="Tale" typeface="Microsoft Tai Le"/>
+        <a:font script="Talu" typeface="Microsoft New Tai Lue"/>
+        <a:font script="Tfng" typeface="Ebrima"/>
+      </a:majorFont>
+      <a:minorFont>
+        <a:latin typeface="Calibri" panose="020F0502020204030204"/>
+        <a:ea typeface=""/>
+        <a:cs typeface=""/>
+        <a:font script="Jpan" typeface="游ゴシック"/>
+        <a:font script="Hang" typeface="맑은 고딕"/>
+        <a:font script="Hans" typeface="等线"/>
+        <a:font script="Hant" typeface="新細明體"/>
+        <a:font script="Arab" typeface="Arial"/>
+        <a:font script="Hebr" typeface="Arial"/>
+        <a:font script="Thai" typeface="Cordia New"/>
+        <a:font script="Ethi" typeface="Nyala"/>
+        <a:font script="Beng" typeface="Vrinda"/>
+        <a:font script="Gujr" typeface="Shruti"/>
+        <a:font script="Khmr" typeface="DaunPenh"/>
+        <a:font script="Knda" typeface="Tunga"/>
+        <a:font script="Guru" typeface="Raavi"/>
+        <a:font script="Cans" typeface="Euphemia"/>
+        <a:font script="Cher" typeface="Plantagenet Cherokee"/>
+        <a:font script="Yiii" typeface="Microsoft Yi Baiti"/>
+        <a:font script="Tibt" typeface="Microsoft Himalaya"/>
+        <a:font script="Thaa" typeface="MV Boli"/>
+        <a:font script="Deva" typeface="Mangal"/>
+        <a:font script="Telu" typeface="Gautami"/>
+        <a:font script="Taml" typeface="Latha"/>
+        <a:font script="Syrc" typeface="Estrangelo Edessa"/>
+        <a:font script="Orya" typeface="Kalinga"/>
+        <a:font script="Mlym" typeface="Kartika"/>
+        <a:font script="Laoo" typeface="DokChampa"/>
+        <a:font script="Sinh" typeface="Iskoola Pota"/>
+        <a:font script="Mong" typeface="Mongolian Baiti"/>
+        <a:font script="Viet" typeface="Arial"/>
+        <a:font script="Uigh" typeface="Microsoft Uighur"/>
+        <a:font script="Geor" typeface="Sylfaen"/>
+        <a:font script="Armn" typeface="Arial"/>
+        <a:font script="Bugi" typeface="Leelawadee UI"/>
+        <a:font script="Bopo" typeface="Microsoft JhengHei"/>
+        <a:font script="Java" typeface="Javanese Text"/>
+        <a:font script="Lisu" typeface="Segoe UI"/>
+        <a:font script="Mymr" typeface="Myanmar Text"/>
+        <a:font script="Nkoo" typeface="Ebrima"/>
+        <a:font script="Olck" typeface="Nirmala UI"/>
+        <a:font script="Osma" typeface="Ebrima"/>
+        <a:font script="Phag" typeface="Phagspa"/>
+        <a:font script="Syrn" typeface="Estrangelo Edessa"/>
+        <a:font script="Syrj" typeface="Estrangelo Edessa"/>
+        <a:font script="Syre" typeface="Estrangelo Edessa"/>
+        <a:font script="Sora" typeface="Nirmala UI"/>
+        <a:font script="Tale" typeface="Microsoft Tai Le"/>
+        <a:font script="Talu" typeface="Microsoft New Tai Lue"/>
+        <a:font script="Tfng" typeface="Ebrima"/>
+      </a:minorFont>
+    </a:fontScheme>
+    <a:fmtScheme name="Office">
+      <a:fillStyleLst>
+        <a:solidFill>
+          <a:schemeClr val="phClr"/>
+        </a:solidFill>
+        <a:gradFill rotWithShape="1">
+          <a:gsLst>
+            <a:gs pos="0">
+              <a:schemeClr val="phClr">
+                <a:lumMod val="110000"/>
+                <a:satMod val="105000"/>
+                <a:tint val="67000"/>
+              </a:schemeClr>
+            </a:gs>
+            <a:gs pos="50000">
+              <a:schemeClr val="phClr">
+                <a:lumMod val="105000"/>
+                <a:satMod val="103000"/>
+                <a:tint val="73000"/>
+              </a:schemeClr>
+            </a:gs>
+            <a:gs pos="100000">
+              <a:schemeClr val="phClr">
+                <a:lumMod val="105000"/>
+                <a:satMod val="109000"/>
+                <a:tint val="81000"/>
+              </a:schemeClr>
+            </a:gs>
+          </a:gsLst>
+          <a:lin ang="5400000" scaled="0"/>
+        </a:gradFill>
+        <a:gradFill rotWithShape="1">
+          <a:gsLst>
+            <a:gs pos="0">
+              <a:schemeClr val="phClr">
+                <a:satMod val="103000"/>
+                <a:lumMod val="102000"/>
+                <a:tint val="94000"/>
+              </a:schemeClr>
+            </a:gs>
+            <a:gs pos="50000">
+              <a:schemeClr val="phClr">
+                <a:satMod val="110000"/>
+                <a:lumMod val="100000"/>
+                <a:shade val="100000"/>
+              </a:schemeClr>
+            </a:gs>
+            <a:gs pos="100000">
+              <a:schemeClr val="phClr">
+                <a:lumMod val="99000"/>
+                <a:satMod val="120000"/>
+                <a:shade val="78000"/>
+              </a:schemeClr>
+            </a:gs>
+          </a:gsLst>
+          <a:lin ang="5400000" scaled="0"/>
+        </a:gradFill>
+      </a:fillStyleLst>
+      <a:lnStyleLst>
+        <a:ln w="6350" cap="flat" cmpd="sng" algn="ctr">
+          <a:solidFill>
+            <a:schemeClr val="phClr"/>
+          </a:solidFill>
+          <a:prstDash val="solid"/>
+          <a:miter lim="800000"/>
+        </a:ln>
+        <a:ln w="12700" cap="flat" cmpd="sng" algn="ctr">
+          <a:solidFill>
+            <a:schemeClr val="phClr"/>
+          </a:solidFill>
+          <a:prstDash val="solid"/>
+          <a:miter lim="800000"/>
+        </a:ln>
+        <a:ln w="19050" cap="flat" cmpd="sng" algn="ctr">
+          <a:solidFill>
+            <a:schemeClr val="phClr"/>
+          </a:solidFill>
+          <a:prstDash val="solid"/>
+          <a:miter lim="800000"/>
+        </a:ln>
+      </a:lnStyleLst>
+      <a:effectStyleLst>
+        <a:effectStyle>
+          <a:effectLst/>
+        </a:effectStyle>
+        <a:effectStyle>
+          <a:effectLst/>
+        </a:effectStyle>
+        <a:effectStyle>
+          <a:effectLst>
+            <a:outerShdw blurRad="57150" dist="19050" dir="5400000" algn="ctr" rotWithShape="0">
+              <a:srgbClr val="000000">
+                <a:alpha val="63000"/>
+              </a:srgbClr>
+            </a:outerShdw>
+          </a:effectLst>
+        </a:effectStyle>
+      </a:effectStyleLst>
+      <a:bgFillStyleLst>
+        <a:solidFill>
+          <a:schemeClr val="phClr"/>
+        </a:solidFill>
+        <a:solidFill>
+          <a:schemeClr val="phClr">
+            <a:tint val="95000"/>
+            <a:satMod val="170000"/>
+          </a:schemeClr>
+        </a:solidFill>
+        <a:gradFill rotWithShape="1">
+          <a:gsLst>
+            <a:gs pos="0">
+              <a:schemeClr val="phClr">
+                <a:tint val="93000"/>
+                <a:satMod val="150000"/>
+                <a:shade val="98000"/>
+                <a:lumMod val="102000"/>
+              </a:schemeClr>
+            </a:gs>
+            <a:gs pos="50000">
+              <a:schemeClr val="phClr">
+                <a:tint val="98000"/>
+                <a:satMod val="130000"/>
+                <a:shade val="90000"/>
+                <a:lumMod val="103000"/>
+              </a:schemeClr>
+            </a:gs>
+            <a:gs pos="100000">
+              <a:schemeClr val="phClr">
+                <a:shade val="63000"/>
+                <a:satMod val="120000"/>
+              </a:schemeClr>
+            </a:gs>
+          </a:gsLst>
+          <a:lin ang="5400000" scaled="0"/>
+        </a:gradFill>
+      </a:bgFillStyleLst>
+    </a:fmtScheme>
+  </a:themeElements>
+  <a:objectDefaults/>
+  <a:extraClrSchemeLst/>
+  <a:extLst>
+    <a:ext uri="{05A4C25C-085E-4340-85A3-A5531E510DB2}">
+      <thm15:themeFamily xmlns:thm15="http://schemas.microsoft.com/office/thememl/2012/main" name="Office Theme" id="{62F939B6-93AF-4DB8-9C6B-D6C7DFDC589F}" vid="{4A3C46E8-61CC-4603-A589-7422A47A8E4A}"/>
+    </a:ext>
+  </a:extLst>
+</a:theme>
 </file>
</xml_diff>